<commit_message>
predavanje 9 i 101
</commit_message>
<xml_diff>
--- a/09 Predavanje/Predavanje 09- DevOps.pptx
+++ b/09 Predavanje/Predavanje 09- DevOps.pptx
@@ -5,7 +5,7 @@
     <p:sldMasterId id="2147483648" r:id="rId1"/>
   </p:sldMasterIdLst>
   <p:notesMasterIdLst>
-    <p:notesMasterId r:id="rId25"/>
+    <p:notesMasterId r:id="rId26"/>
   </p:notesMasterIdLst>
   <p:sldIdLst>
     <p:sldId id="256" r:id="rId2"/>
@@ -31,6 +31,7 @@
     <p:sldId id="273" r:id="rId22"/>
     <p:sldId id="274" r:id="rId23"/>
     <p:sldId id="279" r:id="rId24"/>
+    <p:sldId id="280" r:id="rId25"/>
   </p:sldIdLst>
   <p:sldSz cx="12192000" cy="6858000"/>
   <p:notesSz cx="6858000" cy="9144000"/>
@@ -4124,7 +4125,7 @@
           <a:p>
             <a:fld id="{FA318790-C8E1-4674-8E85-B6A3BF28F428}" type="datetimeFigureOut">
               <a:rPr lang="en-US" smtClean="0"/>
-              <a:t>5/13/2019</a:t>
+              <a:t>5/16/2019</a:t>
             </a:fld>
             <a:endParaRPr lang="en-US"/>
           </a:p>
@@ -4435,1032 +4436,18 @@
           <a:bodyPr/>
           <a:lstStyle/>
           <a:p>
-            <a:pPr lvl="1"/>
-            <a:r>
-              <a:rPr lang="en-US" dirty="0" err="1"/>
-              <a:t>Značaj</a:t>
-            </a:r>
             <a:r>
               <a:rPr lang="bs-Latn-BA" dirty="0"/>
-              <a:t>u</a:t>
-            </a:r>
-            <a:r>
-              <a:rPr lang="en-US" dirty="0"/>
-              <a:t> </a:t>
-            </a:r>
-            <a:r>
-              <a:rPr lang="en-US" dirty="0" err="1"/>
-              <a:t>pojedinca</a:t>
-            </a:r>
-            <a:r>
-              <a:rPr lang="en-US" dirty="0"/>
-              <a:t> – </a:t>
-            </a:r>
-            <a:r>
-              <a:rPr lang="en-US" dirty="0" err="1"/>
-              <a:t>problemi</a:t>
-            </a:r>
-            <a:r>
-              <a:rPr lang="en-US" dirty="0"/>
-              <a:t> se </a:t>
-            </a:r>
-            <a:r>
-              <a:rPr lang="en-US" dirty="0" err="1"/>
-              <a:t>prevazilaze</a:t>
-            </a:r>
-            <a:r>
-              <a:rPr lang="en-US" dirty="0"/>
-              <a:t> </a:t>
-            </a:r>
-            <a:r>
-              <a:rPr lang="en-US" dirty="0" err="1"/>
-              <a:t>zajedničkim</a:t>
-            </a:r>
-            <a:r>
-              <a:rPr lang="en-US" dirty="0"/>
-              <a:t> </a:t>
-            </a:r>
-            <a:r>
-              <a:rPr lang="en-US" dirty="0" err="1"/>
-              <a:t>radom</a:t>
-            </a:r>
-            <a:r>
-              <a:rPr lang="en-US" dirty="0"/>
-              <a:t>, a ne </a:t>
-            </a:r>
-            <a:r>
-              <a:rPr lang="en-US" dirty="0" err="1"/>
-              <a:t>identifikacijom</a:t>
-            </a:r>
-            <a:r>
-              <a:rPr lang="en-US" dirty="0"/>
-              <a:t> </a:t>
-            </a:r>
-            <a:r>
-              <a:rPr lang="en-US" dirty="0" err="1"/>
-              <a:t>pojedinca</a:t>
-            </a:r>
-            <a:r>
-              <a:rPr lang="en-US" dirty="0"/>
-              <a:t> </a:t>
-            </a:r>
-            <a:r>
-              <a:rPr lang="en-US" dirty="0" err="1"/>
-              <a:t>pokazujući</a:t>
-            </a:r>
-            <a:r>
-              <a:rPr lang="en-US" dirty="0"/>
-              <a:t> </a:t>
-            </a:r>
-            <a:r>
-              <a:rPr lang="en-US" dirty="0" err="1"/>
-              <a:t>prstom</a:t>
-            </a:r>
-            <a:r>
-              <a:rPr lang="en-US" dirty="0"/>
-              <a:t> </a:t>
-            </a:r>
-            <a:r>
-              <a:rPr lang="en-US" dirty="0" err="1"/>
-              <a:t>na</a:t>
-            </a:r>
-            <a:r>
-              <a:rPr lang="en-US" dirty="0"/>
-              <a:t> </a:t>
-            </a:r>
-            <a:r>
-              <a:rPr lang="en-US" dirty="0" err="1"/>
-              <a:t>osobu</a:t>
-            </a:r>
-            <a:r>
-              <a:rPr lang="en-US" dirty="0"/>
-              <a:t> </a:t>
-            </a:r>
-            <a:r>
-              <a:rPr lang="en-US" dirty="0" err="1"/>
-              <a:t>koji</a:t>
-            </a:r>
-            <a:r>
-              <a:rPr lang="en-US" dirty="0"/>
-              <a:t> </a:t>
-            </a:r>
-            <a:r>
-              <a:rPr lang="en-US" dirty="0" err="1"/>
-              <a:t>treba</a:t>
-            </a:r>
-            <a:r>
-              <a:rPr lang="en-US" dirty="0"/>
-              <a:t> </a:t>
-            </a:r>
-            <a:r>
-              <a:rPr lang="en-US" dirty="0" err="1"/>
-              <a:t>podnijeti</a:t>
-            </a:r>
-            <a:r>
-              <a:rPr lang="en-US" dirty="0"/>
-              <a:t> </a:t>
-            </a:r>
-            <a:r>
-              <a:rPr lang="en-US" dirty="0" err="1"/>
-              <a:t>cijeli</a:t>
-            </a:r>
-            <a:r>
-              <a:rPr lang="en-US" dirty="0"/>
-              <a:t> </a:t>
-            </a:r>
-            <a:r>
-              <a:rPr lang="en-US" dirty="0" err="1"/>
-              <a:t>teret</a:t>
-            </a:r>
-            <a:r>
-              <a:rPr lang="en-US" dirty="0"/>
-              <a:t> </a:t>
-            </a:r>
-            <a:r>
-              <a:rPr lang="en-US" dirty="0" err="1"/>
-              <a:t>slučaja</a:t>
-            </a:r>
-            <a:r>
-              <a:rPr lang="en-US" dirty="0"/>
-              <a:t> </a:t>
-            </a:r>
-            <a:r>
-              <a:rPr lang="en-US" dirty="0" err="1"/>
-              <a:t>koji</a:t>
-            </a:r>
-            <a:r>
-              <a:rPr lang="en-US" dirty="0"/>
-              <a:t> se </a:t>
-            </a:r>
-            <a:r>
-              <a:rPr lang="en-US" dirty="0" err="1"/>
-              <a:t>proživljava</a:t>
-            </a:r>
-            <a:r>
-              <a:rPr lang="en-US" dirty="0"/>
-              <a:t> u tom </a:t>
-            </a:r>
-            <a:r>
-              <a:rPr lang="en-US" dirty="0" err="1"/>
-              <a:t>momentu</a:t>
-            </a:r>
-            <a:endParaRPr lang="en-US" dirty="0"/>
-          </a:p>
-          <a:p>
-            <a:pPr lvl="1"/>
-            <a:r>
-              <a:rPr lang="en-US" dirty="0" err="1"/>
-              <a:t>Odgovornost</a:t>
-            </a:r>
-            <a:r>
-              <a:rPr lang="en-US" dirty="0"/>
-              <a:t> </a:t>
-            </a:r>
-            <a:r>
-              <a:rPr lang="en-US" dirty="0" err="1"/>
-              <a:t>pojedinca</a:t>
-            </a:r>
-            <a:r>
-              <a:rPr lang="en-US" dirty="0"/>
-              <a:t> </a:t>
-            </a:r>
-            <a:r>
-              <a:rPr lang="en-US" dirty="0" err="1"/>
-              <a:t>i</a:t>
-            </a:r>
-            <a:r>
-              <a:rPr lang="en-US" dirty="0"/>
-              <a:t> </a:t>
-            </a:r>
-            <a:r>
-              <a:rPr lang="en-US" dirty="0" err="1"/>
-              <a:t>tima</a:t>
-            </a:r>
-            <a:r>
-              <a:rPr lang="en-US" dirty="0"/>
-              <a:t> – </a:t>
-            </a:r>
-            <a:r>
-              <a:rPr lang="en-US" dirty="0" err="1"/>
-              <a:t>jedan</a:t>
-            </a:r>
-            <a:r>
-              <a:rPr lang="en-US" dirty="0"/>
-              <a:t> </a:t>
-            </a:r>
-            <a:r>
-              <a:rPr lang="en-US" dirty="0" err="1"/>
-              <a:t>tim</a:t>
-            </a:r>
-            <a:r>
-              <a:rPr lang="en-US" dirty="0"/>
-              <a:t> </a:t>
-            </a:r>
-            <a:r>
-              <a:rPr lang="en-US" dirty="0" err="1"/>
-              <a:t>svoje</a:t>
-            </a:r>
-            <a:r>
-              <a:rPr lang="en-US" dirty="0"/>
-              <a:t> </a:t>
-            </a:r>
-            <a:r>
-              <a:rPr lang="en-US" dirty="0" err="1"/>
-              <a:t>aktivnosti</a:t>
-            </a:r>
-            <a:r>
-              <a:rPr lang="en-US" dirty="0"/>
-              <a:t> u </a:t>
-            </a:r>
-            <a:r>
-              <a:rPr lang="en-US" dirty="0" err="1"/>
-              <a:t>potpunosti</a:t>
-            </a:r>
-            <a:r>
-              <a:rPr lang="en-US" dirty="0"/>
-              <a:t> </a:t>
-            </a:r>
-            <a:r>
-              <a:rPr lang="en-US" dirty="0" err="1"/>
-              <a:t>oslanja</a:t>
-            </a:r>
-            <a:r>
-              <a:rPr lang="en-US" dirty="0"/>
-              <a:t> </a:t>
-            </a:r>
-            <a:r>
-              <a:rPr lang="en-US" dirty="0" err="1"/>
-              <a:t>na</a:t>
-            </a:r>
-            <a:r>
-              <a:rPr lang="en-US" dirty="0"/>
-              <a:t> </a:t>
-            </a:r>
-            <a:r>
-              <a:rPr lang="en-US" dirty="0" err="1"/>
-              <a:t>odgovornost</a:t>
-            </a:r>
-            <a:r>
-              <a:rPr lang="en-US" dirty="0"/>
-              <a:t> </a:t>
-            </a:r>
-            <a:r>
-              <a:rPr lang="en-US" dirty="0" err="1"/>
-              <a:t>drugih</a:t>
-            </a:r>
-            <a:r>
-              <a:rPr lang="en-US" dirty="0"/>
-              <a:t> </a:t>
-            </a:r>
-            <a:r>
-              <a:rPr lang="en-US" dirty="0" err="1"/>
-              <a:t>timova</a:t>
-            </a:r>
-            <a:r>
-              <a:rPr lang="en-US" dirty="0"/>
-              <a:t> </a:t>
-            </a:r>
-            <a:r>
-              <a:rPr lang="en-US" dirty="0" err="1"/>
-              <a:t>i</a:t>
-            </a:r>
-            <a:r>
-              <a:rPr lang="en-US" dirty="0"/>
-              <a:t> </a:t>
-            </a:r>
-            <a:r>
-              <a:rPr lang="en-US" dirty="0" err="1"/>
-              <a:t>pojedinaca</a:t>
-            </a:r>
-            <a:r>
-              <a:rPr lang="en-US" dirty="0"/>
-              <a:t> </a:t>
-            </a:r>
-            <a:r>
-              <a:rPr lang="en-US" dirty="0" err="1"/>
-              <a:t>sa</a:t>
-            </a:r>
-            <a:r>
-              <a:rPr lang="en-US" dirty="0"/>
-              <a:t> </a:t>
-            </a:r>
-            <a:r>
-              <a:rPr lang="en-US" dirty="0" err="1"/>
-              <a:t>kojima</a:t>
-            </a:r>
-            <a:r>
-              <a:rPr lang="en-US" dirty="0"/>
-              <a:t> </a:t>
-            </a:r>
-            <a:r>
-              <a:rPr lang="en-US" dirty="0" err="1"/>
-              <a:t>radi</a:t>
-            </a:r>
-            <a:r>
-              <a:rPr lang="en-US" dirty="0"/>
-              <a:t> </a:t>
-            </a:r>
-            <a:r>
-              <a:rPr lang="en-US" dirty="0" err="1"/>
-              <a:t>na</a:t>
-            </a:r>
-            <a:r>
-              <a:rPr lang="en-US" dirty="0"/>
-              <a:t> </a:t>
-            </a:r>
-            <a:r>
-              <a:rPr lang="en-US" dirty="0" err="1"/>
-              <a:t>projektu</a:t>
-            </a:r>
-            <a:endParaRPr lang="en-US" dirty="0"/>
-          </a:p>
-          <a:p>
-            <a:pPr lvl="1"/>
-            <a:r>
-              <a:rPr lang="en-US" dirty="0" err="1"/>
-              <a:t>Timski</a:t>
-            </a:r>
-            <a:r>
-              <a:rPr lang="en-US" dirty="0"/>
-              <a:t> rad </a:t>
-            </a:r>
-            <a:r>
-              <a:rPr lang="en-US" dirty="0" err="1"/>
-              <a:t>i</a:t>
-            </a:r>
-            <a:r>
-              <a:rPr lang="en-US" dirty="0"/>
-              <a:t> </a:t>
-            </a:r>
-            <a:r>
-              <a:rPr lang="en-US" dirty="0" err="1"/>
-              <a:t>povjerenje</a:t>
-            </a:r>
-            <a:r>
-              <a:rPr lang="en-US" dirty="0"/>
-              <a:t> – </a:t>
-            </a:r>
-            <a:r>
-              <a:rPr lang="en-US" dirty="0" err="1"/>
-              <a:t>slučajevi</a:t>
-            </a:r>
-            <a:r>
-              <a:rPr lang="en-US" dirty="0"/>
-              <a:t> u </a:t>
-            </a:r>
-            <a:r>
-              <a:rPr lang="en-US" dirty="0" err="1"/>
-              <a:t>kojima</a:t>
-            </a:r>
-            <a:r>
-              <a:rPr lang="en-US" dirty="0"/>
-              <a:t> </a:t>
-            </a:r>
-            <a:r>
-              <a:rPr lang="en-US" dirty="0" err="1"/>
-              <a:t>samo</a:t>
-            </a:r>
-            <a:r>
-              <a:rPr lang="en-US" dirty="0"/>
-              <a:t> </a:t>
-            </a:r>
-            <a:r>
-              <a:rPr lang="en-US" dirty="0" err="1"/>
-              <a:t>jedan</a:t>
-            </a:r>
-            <a:r>
-              <a:rPr lang="en-US" dirty="0"/>
-              <a:t> </a:t>
-            </a:r>
-            <a:r>
-              <a:rPr lang="en-US" dirty="0" err="1"/>
-              <a:t>tim</a:t>
-            </a:r>
-            <a:r>
-              <a:rPr lang="en-US" dirty="0"/>
-              <a:t>, za </a:t>
-            </a:r>
-            <a:r>
-              <a:rPr lang="en-US" dirty="0" err="1"/>
-              <a:t>razliku</a:t>
-            </a:r>
-            <a:r>
-              <a:rPr lang="en-US" dirty="0"/>
-              <a:t> od </a:t>
-            </a:r>
-            <a:r>
-              <a:rPr lang="en-US" dirty="0" err="1"/>
-              <a:t>ostalih</a:t>
-            </a:r>
-            <a:r>
-              <a:rPr lang="en-US" dirty="0"/>
-              <a:t> </a:t>
-            </a:r>
-            <a:r>
-              <a:rPr lang="en-US" dirty="0" err="1"/>
-              <a:t>timova</a:t>
-            </a:r>
-            <a:r>
-              <a:rPr lang="en-US" dirty="0"/>
-              <a:t>, </a:t>
-            </a:r>
-            <a:r>
-              <a:rPr lang="en-US" dirty="0" err="1"/>
-              <a:t>radi</a:t>
-            </a:r>
-            <a:r>
-              <a:rPr lang="en-US" dirty="0"/>
-              <a:t> </a:t>
-            </a:r>
-            <a:r>
-              <a:rPr lang="en-US" dirty="0" err="1"/>
-              <a:t>sinhronizovano</a:t>
-            </a:r>
-            <a:r>
-              <a:rPr lang="en-US" dirty="0"/>
-              <a:t> </a:t>
-            </a:r>
-            <a:r>
-              <a:rPr lang="en-US" dirty="0" err="1"/>
-              <a:t>nije</a:t>
-            </a:r>
-            <a:r>
-              <a:rPr lang="en-US" dirty="0"/>
-              <a:t> </a:t>
-            </a:r>
-            <a:r>
-              <a:rPr lang="en-US" dirty="0" err="1"/>
-              <a:t>neki</a:t>
-            </a:r>
-            <a:r>
-              <a:rPr lang="en-US" dirty="0"/>
-              <a:t> </a:t>
-            </a:r>
-            <a:r>
-              <a:rPr lang="en-US" dirty="0" err="1"/>
-              <a:t>pretjeran</a:t>
-            </a:r>
-            <a:r>
-              <a:rPr lang="en-US" dirty="0"/>
-              <a:t> </a:t>
-            </a:r>
-            <a:r>
-              <a:rPr lang="en-US" dirty="0" err="1"/>
-              <a:t>uspjeh</a:t>
-            </a:r>
-            <a:r>
-              <a:rPr lang="en-US" dirty="0"/>
-              <a:t>. </a:t>
-            </a:r>
-            <a:r>
-              <a:rPr lang="en-US" dirty="0" err="1"/>
-              <a:t>Timovi</a:t>
-            </a:r>
-            <a:r>
-              <a:rPr lang="en-US" dirty="0"/>
-              <a:t> </a:t>
-            </a:r>
-            <a:r>
-              <a:rPr lang="en-US" dirty="0" err="1"/>
-              <a:t>stalno</a:t>
-            </a:r>
-            <a:r>
-              <a:rPr lang="en-US" dirty="0"/>
-              <a:t> </a:t>
-            </a:r>
-            <a:r>
-              <a:rPr lang="en-US" dirty="0" err="1"/>
-              <a:t>trebaju</a:t>
-            </a:r>
-            <a:r>
-              <a:rPr lang="en-US" dirty="0"/>
-              <a:t> </a:t>
-            </a:r>
-            <a:r>
-              <a:rPr lang="en-US" dirty="0" err="1"/>
-              <a:t>komunicirati</a:t>
-            </a:r>
-            <a:r>
-              <a:rPr lang="en-US" dirty="0"/>
-              <a:t> </a:t>
-            </a:r>
-            <a:r>
-              <a:rPr lang="en-US" dirty="0" err="1"/>
-              <a:t>i</a:t>
-            </a:r>
-            <a:r>
-              <a:rPr lang="en-US" dirty="0"/>
-              <a:t> </a:t>
-            </a:r>
-            <a:r>
-              <a:rPr lang="en-US" dirty="0" err="1"/>
-              <a:t>sarađivati</a:t>
-            </a:r>
-            <a:r>
-              <a:rPr lang="en-US" dirty="0"/>
-              <a:t>, </a:t>
-            </a:r>
-            <a:r>
-              <a:rPr lang="en-US" dirty="0" err="1"/>
-              <a:t>te</a:t>
-            </a:r>
-            <a:r>
-              <a:rPr lang="en-US" dirty="0"/>
-              <a:t> </a:t>
-            </a:r>
-            <a:r>
-              <a:rPr lang="en-US" dirty="0" err="1"/>
-              <a:t>unapređivati</a:t>
-            </a:r>
-            <a:r>
-              <a:rPr lang="en-US" dirty="0"/>
-              <a:t> </a:t>
-            </a:r>
-            <a:r>
-              <a:rPr lang="en-US" dirty="0" err="1"/>
-              <a:t>jedni</a:t>
-            </a:r>
-            <a:r>
-              <a:rPr lang="en-US" dirty="0"/>
-              <a:t> </a:t>
-            </a:r>
-            <a:r>
-              <a:rPr lang="en-US" dirty="0" err="1"/>
-              <a:t>druge</a:t>
-            </a:r>
-            <a:r>
-              <a:rPr lang="en-US" dirty="0"/>
-              <a:t>. U tom </a:t>
-            </a:r>
-            <a:r>
-              <a:rPr lang="en-US" dirty="0" err="1"/>
-              <a:t>smislu</a:t>
-            </a:r>
-            <a:r>
-              <a:rPr lang="en-US" dirty="0"/>
-              <a:t> </a:t>
-            </a:r>
-            <a:r>
-              <a:rPr lang="en-US" dirty="0" err="1"/>
-              <a:t>veliki</a:t>
-            </a:r>
-            <a:r>
-              <a:rPr lang="en-US" dirty="0"/>
-              <a:t> </a:t>
-            </a:r>
-            <a:r>
-              <a:rPr lang="en-US" dirty="0" err="1"/>
-              <a:t>značaj</a:t>
-            </a:r>
-            <a:r>
-              <a:rPr lang="en-US" dirty="0"/>
-              <a:t> </a:t>
-            </a:r>
-            <a:r>
-              <a:rPr lang="en-US" dirty="0" err="1"/>
-              <a:t>imaju</a:t>
-            </a:r>
-            <a:r>
-              <a:rPr lang="en-US" dirty="0"/>
-              <a:t>: </a:t>
-            </a:r>
-            <a:r>
-              <a:rPr lang="en-US" dirty="0" err="1"/>
-              <a:t>zajednički</a:t>
-            </a:r>
-            <a:r>
-              <a:rPr lang="en-US" dirty="0"/>
-              <a:t> </a:t>
-            </a:r>
-            <a:r>
-              <a:rPr lang="en-US" dirty="0" err="1"/>
-              <a:t>sastanci</a:t>
-            </a:r>
-            <a:r>
-              <a:rPr lang="en-US" dirty="0"/>
-              <a:t>, </a:t>
-            </a:r>
-            <a:r>
-              <a:rPr lang="en-US" dirty="0" err="1"/>
-              <a:t>druženja</a:t>
-            </a:r>
-            <a:r>
-              <a:rPr lang="en-US" dirty="0"/>
-              <a:t>, </a:t>
-            </a:r>
-            <a:r>
-              <a:rPr lang="en-US" dirty="0" err="1"/>
-              <a:t>ručkovi</a:t>
-            </a:r>
-            <a:r>
-              <a:rPr lang="en-US" dirty="0"/>
-              <a:t>, teambuilding </a:t>
-            </a:r>
-            <a:r>
-              <a:rPr lang="en-US" dirty="0" err="1"/>
-              <a:t>događaji</a:t>
-            </a:r>
-            <a:r>
-              <a:rPr lang="en-US" dirty="0"/>
-              <a:t> </a:t>
-            </a:r>
-            <a:r>
-              <a:rPr lang="en-US" dirty="0" err="1"/>
-              <a:t>i</a:t>
-            </a:r>
-            <a:r>
-              <a:rPr lang="en-US" dirty="0"/>
-              <a:t> sl.</a:t>
-            </a:r>
-          </a:p>
-          <a:p>
-            <a:pPr lvl="1"/>
-            <a:r>
-              <a:rPr lang="en-US" dirty="0" err="1"/>
-              <a:t>Stalno</a:t>
-            </a:r>
-            <a:r>
-              <a:rPr lang="en-US" dirty="0"/>
-              <a:t> </a:t>
-            </a:r>
-            <a:r>
-              <a:rPr lang="en-US" dirty="0" err="1"/>
-              <a:t>učenje</a:t>
-            </a:r>
-            <a:r>
-              <a:rPr lang="en-US" dirty="0"/>
-              <a:t> – </a:t>
-            </a:r>
-            <a:r>
-              <a:rPr lang="en-US" dirty="0" err="1"/>
-              <a:t>dijeljenje</a:t>
-            </a:r>
-            <a:r>
-              <a:rPr lang="en-US" dirty="0"/>
-              <a:t> </a:t>
-            </a:r>
-            <a:r>
-              <a:rPr lang="en-US" dirty="0" err="1"/>
-              <a:t>znanja</a:t>
-            </a:r>
-            <a:r>
-              <a:rPr lang="en-US" dirty="0"/>
-              <a:t> </a:t>
-            </a:r>
-            <a:r>
-              <a:rPr lang="en-US" dirty="0" err="1"/>
-              <a:t>i</a:t>
-            </a:r>
-            <a:r>
-              <a:rPr lang="en-US" dirty="0"/>
-              <a:t> </a:t>
-            </a:r>
-            <a:r>
-              <a:rPr lang="en-US" dirty="0" err="1"/>
-              <a:t>stalno</a:t>
-            </a:r>
-            <a:r>
-              <a:rPr lang="en-US" dirty="0"/>
-              <a:t> </a:t>
-            </a:r>
-            <a:r>
-              <a:rPr lang="en-US" dirty="0" err="1"/>
-              <a:t>izgrađivanje</a:t>
-            </a:r>
-            <a:r>
-              <a:rPr lang="en-US" dirty="0"/>
-              <a:t>, </a:t>
-            </a:r>
-            <a:r>
-              <a:rPr lang="en-US" dirty="0" err="1"/>
-              <a:t>kako</a:t>
-            </a:r>
-            <a:r>
-              <a:rPr lang="en-US" dirty="0"/>
-              <a:t> </a:t>
-            </a:r>
-            <a:r>
-              <a:rPr lang="en-US" dirty="0" err="1"/>
-              <a:t>pojedinačno</a:t>
-            </a:r>
-            <a:r>
-              <a:rPr lang="en-US" dirty="0"/>
-              <a:t> </a:t>
-            </a:r>
-            <a:r>
-              <a:rPr lang="en-US" dirty="0" err="1"/>
-              <a:t>tako</a:t>
-            </a:r>
-            <a:r>
-              <a:rPr lang="en-US" dirty="0"/>
-              <a:t> </a:t>
-            </a:r>
-            <a:r>
-              <a:rPr lang="en-US" dirty="0" err="1"/>
-              <a:t>i</a:t>
-            </a:r>
-            <a:r>
-              <a:rPr lang="en-US" dirty="0"/>
-              <a:t> </a:t>
-            </a:r>
-            <a:r>
-              <a:rPr lang="en-US" dirty="0" err="1"/>
-              <a:t>timski</a:t>
-            </a:r>
-            <a:r>
-              <a:rPr lang="en-US" dirty="0"/>
-              <a:t> (</a:t>
-            </a:r>
-            <a:r>
-              <a:rPr lang="en-US" dirty="0" err="1"/>
-              <a:t>konferencije</a:t>
-            </a:r>
-            <a:r>
-              <a:rPr lang="en-US" dirty="0"/>
-              <a:t>, online </a:t>
-            </a:r>
-            <a:r>
-              <a:rPr lang="en-US" dirty="0" err="1"/>
-              <a:t>kursevi</a:t>
-            </a:r>
-            <a:r>
-              <a:rPr lang="en-US" dirty="0"/>
-              <a:t>, </a:t>
-            </a:r>
-            <a:r>
-              <a:rPr lang="en-US" dirty="0" err="1"/>
-              <a:t>kursevi</a:t>
-            </a:r>
-            <a:r>
-              <a:rPr lang="en-US" dirty="0"/>
-              <a:t> </a:t>
-            </a:r>
-            <a:r>
-              <a:rPr lang="en-US" dirty="0" err="1"/>
-              <a:t>unutar</a:t>
-            </a:r>
-            <a:r>
-              <a:rPr lang="en-US" dirty="0"/>
-              <a:t> </a:t>
-            </a:r>
-            <a:r>
-              <a:rPr lang="en-US" dirty="0" err="1"/>
-              <a:t>kompanije</a:t>
-            </a:r>
-            <a:r>
-              <a:rPr lang="en-US" dirty="0"/>
-              <a:t> </a:t>
-            </a:r>
-            <a:r>
-              <a:rPr lang="en-US" dirty="0" err="1"/>
-              <a:t>i</a:t>
-            </a:r>
-            <a:r>
-              <a:rPr lang="en-US" dirty="0"/>
-              <a:t> sl.), </a:t>
-            </a:r>
-            <a:r>
-              <a:rPr lang="en-US" dirty="0" err="1"/>
-              <a:t>prezentovanje</a:t>
-            </a:r>
-            <a:r>
-              <a:rPr lang="en-US" dirty="0"/>
-              <a:t> </a:t>
-            </a:r>
-            <a:r>
-              <a:rPr lang="en-US" dirty="0" err="1"/>
-              <a:t>identifikovanih</a:t>
-            </a:r>
-            <a:r>
-              <a:rPr lang="en-US" dirty="0"/>
-              <a:t> </a:t>
-            </a:r>
-            <a:r>
-              <a:rPr lang="en-US" dirty="0" err="1"/>
-              <a:t>problema</a:t>
-            </a:r>
-            <a:r>
-              <a:rPr lang="en-US" dirty="0"/>
-              <a:t> </a:t>
-            </a:r>
-            <a:r>
-              <a:rPr lang="en-US" dirty="0" err="1"/>
-              <a:t>i</a:t>
-            </a:r>
-            <a:r>
-              <a:rPr lang="en-US" dirty="0"/>
-              <a:t> </a:t>
-            </a:r>
-            <a:r>
-              <a:rPr lang="en-US" dirty="0" err="1"/>
-              <a:t>pristupa</a:t>
-            </a:r>
-            <a:r>
-              <a:rPr lang="en-US" dirty="0"/>
-              <a:t> </a:t>
-            </a:r>
-            <a:r>
-              <a:rPr lang="en-US" dirty="0" err="1"/>
-              <a:t>njihovom</a:t>
-            </a:r>
-            <a:r>
-              <a:rPr lang="en-US" dirty="0"/>
-              <a:t> </a:t>
-            </a:r>
-            <a:r>
-              <a:rPr lang="en-US" dirty="0" err="1"/>
-              <a:t>rješavanju</a:t>
-            </a:r>
-            <a:endParaRPr lang="en-US" dirty="0"/>
-          </a:p>
-          <a:p>
-            <a:pPr lvl="1"/>
-            <a:r>
-              <a:rPr lang="en-US" dirty="0" err="1"/>
-              <a:t>Vrijednosti</a:t>
-            </a:r>
-            <a:r>
-              <a:rPr lang="en-US" dirty="0"/>
-              <a:t> – </a:t>
-            </a:r>
-            <a:r>
-              <a:rPr lang="en-US" dirty="0" err="1"/>
-              <a:t>potrebno</a:t>
-            </a:r>
-            <a:r>
-              <a:rPr lang="en-US" dirty="0"/>
-              <a:t> je </a:t>
-            </a:r>
-            <a:r>
-              <a:rPr lang="en-US" dirty="0" err="1"/>
-              <a:t>voditi</a:t>
-            </a:r>
-            <a:r>
-              <a:rPr lang="en-US" dirty="0"/>
-              <a:t> </a:t>
-            </a:r>
-            <a:r>
-              <a:rPr lang="en-US" dirty="0" err="1"/>
-              <a:t>računa</a:t>
-            </a:r>
-            <a:r>
-              <a:rPr lang="en-US" dirty="0"/>
-              <a:t> o </a:t>
-            </a:r>
-            <a:r>
-              <a:rPr lang="en-US" dirty="0" err="1"/>
-              <a:t>vrijednostima</a:t>
-            </a:r>
-            <a:r>
-              <a:rPr lang="en-US" dirty="0"/>
-              <a:t> </a:t>
-            </a:r>
-            <a:r>
-              <a:rPr lang="en-US" dirty="0" err="1"/>
-              <a:t>koje</a:t>
-            </a:r>
-            <a:r>
-              <a:rPr lang="en-US" dirty="0"/>
-              <a:t> se </a:t>
-            </a:r>
-            <a:r>
-              <a:rPr lang="en-US" dirty="0" err="1"/>
-              <a:t>prepoznaju</a:t>
-            </a:r>
-            <a:r>
-              <a:rPr lang="en-US" dirty="0"/>
-              <a:t> </a:t>
-            </a:r>
-            <a:r>
-              <a:rPr lang="en-US" dirty="0" err="1"/>
-              <a:t>i</a:t>
-            </a:r>
-            <a:r>
-              <a:rPr lang="en-US" dirty="0"/>
-              <a:t>/</a:t>
-            </a:r>
-            <a:r>
-              <a:rPr lang="en-US" dirty="0" err="1"/>
-              <a:t>ili</a:t>
-            </a:r>
-            <a:r>
-              <a:rPr lang="en-US" dirty="0"/>
-              <a:t> </a:t>
-            </a:r>
-            <a:r>
-              <a:rPr lang="en-US" dirty="0" err="1"/>
-              <a:t>nagrađuju</a:t>
-            </a:r>
-            <a:r>
-              <a:rPr lang="en-US" dirty="0"/>
-              <a:t> (</a:t>
-            </a:r>
-            <a:r>
-              <a:rPr lang="en-US" dirty="0" err="1"/>
-              <a:t>kašnjenje</a:t>
-            </a:r>
-            <a:r>
-              <a:rPr lang="en-US" dirty="0"/>
-              <a:t> </a:t>
-            </a:r>
-            <a:r>
-              <a:rPr lang="en-US" dirty="0" err="1"/>
-              <a:t>na</a:t>
-            </a:r>
-            <a:r>
-              <a:rPr lang="en-US" dirty="0"/>
-              <a:t> </a:t>
-            </a:r>
-            <a:r>
-              <a:rPr lang="en-US" dirty="0" err="1"/>
-              <a:t>posao</a:t>
-            </a:r>
-            <a:r>
-              <a:rPr lang="en-US" dirty="0"/>
-              <a:t> </a:t>
-            </a:r>
-            <a:r>
-              <a:rPr lang="en-US" dirty="0" err="1"/>
-              <a:t>i</a:t>
-            </a:r>
-            <a:r>
-              <a:rPr lang="en-US" dirty="0"/>
-              <a:t> </a:t>
-            </a:r>
-            <a:r>
-              <a:rPr lang="en-US" dirty="0" err="1"/>
-              <a:t>kvalitetan</a:t>
-            </a:r>
-            <a:r>
-              <a:rPr lang="en-US" dirty="0"/>
-              <a:t> rad </a:t>
-            </a:r>
-            <a:r>
-              <a:rPr lang="en-US" dirty="0" err="1"/>
-              <a:t>ili</a:t>
-            </a:r>
-            <a:r>
-              <a:rPr lang="en-US" dirty="0"/>
-              <a:t> </a:t>
-            </a:r>
-            <a:r>
-              <a:rPr lang="en-US" dirty="0" err="1"/>
-              <a:t>dolazak</a:t>
-            </a:r>
-            <a:r>
-              <a:rPr lang="en-US" dirty="0"/>
-              <a:t> </a:t>
-            </a:r>
-            <a:r>
-              <a:rPr lang="en-US" dirty="0" err="1"/>
-              <a:t>na</a:t>
-            </a:r>
-            <a:r>
-              <a:rPr lang="en-US" dirty="0"/>
-              <a:t> </a:t>
-            </a:r>
-            <a:r>
-              <a:rPr lang="en-US" dirty="0" err="1"/>
-              <a:t>vrijeme</a:t>
-            </a:r>
-            <a:r>
-              <a:rPr lang="en-US" dirty="0"/>
-              <a:t> </a:t>
-            </a:r>
-            <a:r>
-              <a:rPr lang="en-US" dirty="0" err="1"/>
-              <a:t>i</a:t>
-            </a:r>
-            <a:r>
-              <a:rPr lang="en-US" dirty="0"/>
-              <a:t> </a:t>
-            </a:r>
-            <a:r>
-              <a:rPr lang="en-US" dirty="0" err="1"/>
-              <a:t>mnogo</a:t>
-            </a:r>
-            <a:r>
-              <a:rPr lang="en-US" dirty="0"/>
-              <a:t> </a:t>
-            </a:r>
-            <a:r>
-              <a:rPr lang="en-US" dirty="0" err="1"/>
-              <a:t>nedostataka</a:t>
-            </a:r>
-            <a:r>
-              <a:rPr lang="en-US" dirty="0"/>
-              <a:t> u </a:t>
-            </a:r>
-            <a:r>
-              <a:rPr lang="en-US" dirty="0" err="1"/>
-              <a:t>radu</a:t>
-            </a:r>
-            <a:r>
-              <a:rPr lang="en-US" dirty="0"/>
-              <a:t>)</a:t>
-            </a:r>
-          </a:p>
-          <a:p>
+              <a:t>Razvoj kvalitetnog, dobro </a:t>
+            </a:r>
+            <a:r>
+              <a:rPr lang="bs-Latn-BA" dirty="0" err="1"/>
+              <a:t>organizavonog</a:t>
+            </a:r>
+            <a:r>
+              <a:rPr lang="bs-Latn-BA" dirty="0"/>
+              <a:t> i uspješnog softverskog rješenja možemo bazirati na nekoliko vrlo jednostavnih pitanja:</a:t>
+            </a:r>
             <a:endParaRPr lang="en-US" dirty="0"/>
           </a:p>
         </p:txBody>
@@ -5482,6 +4469,1292 @@
           <a:p>
             <a:fld id="{7B12DC4F-78C5-4EA5-A0E6-C5E98FFDA7F4}" type="slidenum">
               <a:rPr lang="en-US" smtClean="0"/>
+              <a:t>3</a:t>
+            </a:fld>
+            <a:endParaRPr lang="en-US"/>
+          </a:p>
+        </p:txBody>
+      </p:sp>
+    </p:spTree>
+    <p:extLst>
+      <p:ext uri="{BB962C8B-B14F-4D97-AF65-F5344CB8AC3E}">
+        <p14:creationId xmlns:p14="http://schemas.microsoft.com/office/powerpoint/2010/main" val="844708373"/>
+      </p:ext>
+    </p:extLst>
+  </p:cSld>
+  <p:clrMapOvr>
+    <a:masterClrMapping/>
+  </p:clrMapOvr>
+</p:notes>
+</file>
+
+<file path=ppt/notesSlides/notesSlide2.xml><?xml version="1.0" encoding="utf-8"?>
+<p:notes xmlns:a="http://schemas.openxmlformats.org/drawingml/2006/main" xmlns:r="http://schemas.openxmlformats.org/officeDocument/2006/relationships" xmlns:p="http://schemas.openxmlformats.org/presentationml/2006/main">
+  <p:cSld>
+    <p:spTree>
+      <p:nvGrpSpPr>
+        <p:cNvPr id="1" name=""/>
+        <p:cNvGrpSpPr/>
+        <p:nvPr/>
+      </p:nvGrpSpPr>
+      <p:grpSpPr>
+        <a:xfrm>
+          <a:off x="0" y="0"/>
+          <a:ext cx="0" cy="0"/>
+          <a:chOff x="0" y="0"/>
+          <a:chExt cx="0" cy="0"/>
+        </a:xfrm>
+      </p:grpSpPr>
+      <p:sp>
+        <p:nvSpPr>
+          <p:cNvPr id="2" name="Slide Image Placeholder 1"/>
+          <p:cNvSpPr>
+            <a:spLocks noGrp="1" noRot="1" noChangeAspect="1"/>
+          </p:cNvSpPr>
+          <p:nvPr>
+            <p:ph type="sldImg"/>
+          </p:nvPr>
+        </p:nvSpPr>
+        <p:spPr/>
+      </p:sp>
+      <p:sp>
+        <p:nvSpPr>
+          <p:cNvPr id="3" name="Notes Placeholder 2"/>
+          <p:cNvSpPr>
+            <a:spLocks noGrp="1"/>
+          </p:cNvSpPr>
+          <p:nvPr>
+            <p:ph type="body" idx="1"/>
+          </p:nvPr>
+        </p:nvSpPr>
+        <p:spPr/>
+        <p:txBody>
+          <a:bodyPr/>
+          <a:lstStyle/>
+          <a:p>
+            <a:r>
+              <a:rPr lang="bs-Latn-BA" dirty="0"/>
+              <a:t>Rokovi isporuke se često ne prate zbog </a:t>
+            </a:r>
+            <a:endParaRPr lang="en-US" dirty="0"/>
+          </a:p>
+        </p:txBody>
+      </p:sp>
+      <p:sp>
+        <p:nvSpPr>
+          <p:cNvPr id="4" name="Slide Number Placeholder 3"/>
+          <p:cNvSpPr>
+            <a:spLocks noGrp="1"/>
+          </p:cNvSpPr>
+          <p:nvPr>
+            <p:ph type="sldNum" sz="quarter" idx="5"/>
+          </p:nvPr>
+        </p:nvSpPr>
+        <p:spPr/>
+        <p:txBody>
+          <a:bodyPr/>
+          <a:lstStyle/>
+          <a:p>
+            <a:fld id="{7B12DC4F-78C5-4EA5-A0E6-C5E98FFDA7F4}" type="slidenum">
+              <a:rPr lang="en-US" smtClean="0"/>
+              <a:t>4</a:t>
+            </a:fld>
+            <a:endParaRPr lang="en-US"/>
+          </a:p>
+        </p:txBody>
+      </p:sp>
+    </p:spTree>
+    <p:extLst>
+      <p:ext uri="{BB962C8B-B14F-4D97-AF65-F5344CB8AC3E}">
+        <p14:creationId xmlns:p14="http://schemas.microsoft.com/office/powerpoint/2010/main" val="2018187991"/>
+      </p:ext>
+    </p:extLst>
+  </p:cSld>
+  <p:clrMapOvr>
+    <a:masterClrMapping/>
+  </p:clrMapOvr>
+</p:notes>
+</file>
+
+<file path=ppt/notesSlides/notesSlide3.xml><?xml version="1.0" encoding="utf-8"?>
+<p:notes xmlns:a="http://schemas.openxmlformats.org/drawingml/2006/main" xmlns:r="http://schemas.openxmlformats.org/officeDocument/2006/relationships" xmlns:p="http://schemas.openxmlformats.org/presentationml/2006/main">
+  <p:cSld>
+    <p:spTree>
+      <p:nvGrpSpPr>
+        <p:cNvPr id="1" name=""/>
+        <p:cNvGrpSpPr/>
+        <p:nvPr/>
+      </p:nvGrpSpPr>
+      <p:grpSpPr>
+        <a:xfrm>
+          <a:off x="0" y="0"/>
+          <a:ext cx="0" cy="0"/>
+          <a:chOff x="0" y="0"/>
+          <a:chExt cx="0" cy="0"/>
+        </a:xfrm>
+      </p:grpSpPr>
+      <p:sp>
+        <p:nvSpPr>
+          <p:cNvPr id="2" name="Slide Image Placeholder 1"/>
+          <p:cNvSpPr>
+            <a:spLocks noGrp="1" noRot="1" noChangeAspect="1"/>
+          </p:cNvSpPr>
+          <p:nvPr>
+            <p:ph type="sldImg"/>
+          </p:nvPr>
+        </p:nvSpPr>
+        <p:spPr/>
+      </p:sp>
+      <p:sp>
+        <p:nvSpPr>
+          <p:cNvPr id="3" name="Notes Placeholder 2"/>
+          <p:cNvSpPr>
+            <a:spLocks noGrp="1"/>
+          </p:cNvSpPr>
+          <p:nvPr>
+            <p:ph type="body" idx="1"/>
+          </p:nvPr>
+        </p:nvSpPr>
+        <p:spPr/>
+        <p:txBody>
+          <a:bodyPr/>
+          <a:lstStyle/>
+          <a:p>
+            <a:r>
+              <a:rPr lang="bs-Latn-BA" dirty="0"/>
+              <a:t>Optimalno trošenje resursa </a:t>
+            </a:r>
+            <a:endParaRPr lang="en-US" dirty="0"/>
+          </a:p>
+        </p:txBody>
+      </p:sp>
+      <p:sp>
+        <p:nvSpPr>
+          <p:cNvPr id="4" name="Slide Number Placeholder 3"/>
+          <p:cNvSpPr>
+            <a:spLocks noGrp="1"/>
+          </p:cNvSpPr>
+          <p:nvPr>
+            <p:ph type="sldNum" sz="quarter" idx="5"/>
+          </p:nvPr>
+        </p:nvSpPr>
+        <p:spPr/>
+        <p:txBody>
+          <a:bodyPr/>
+          <a:lstStyle/>
+          <a:p>
+            <a:fld id="{7B12DC4F-78C5-4EA5-A0E6-C5E98FFDA7F4}" type="slidenum">
+              <a:rPr lang="en-US" smtClean="0"/>
+              <a:t>5</a:t>
+            </a:fld>
+            <a:endParaRPr lang="en-US"/>
+          </a:p>
+        </p:txBody>
+      </p:sp>
+    </p:spTree>
+    <p:extLst>
+      <p:ext uri="{BB962C8B-B14F-4D97-AF65-F5344CB8AC3E}">
+        <p14:creationId xmlns:p14="http://schemas.microsoft.com/office/powerpoint/2010/main" val="2631088700"/>
+      </p:ext>
+    </p:extLst>
+  </p:cSld>
+  <p:clrMapOvr>
+    <a:masterClrMapping/>
+  </p:clrMapOvr>
+</p:notes>
+</file>
+
+<file path=ppt/notesSlides/notesSlide4.xml><?xml version="1.0" encoding="utf-8"?>
+<p:notes xmlns:a="http://schemas.openxmlformats.org/drawingml/2006/main" xmlns:r="http://schemas.openxmlformats.org/officeDocument/2006/relationships" xmlns:p="http://schemas.openxmlformats.org/presentationml/2006/main">
+  <p:cSld>
+    <p:spTree>
+      <p:nvGrpSpPr>
+        <p:cNvPr id="1" name=""/>
+        <p:cNvGrpSpPr/>
+        <p:nvPr/>
+      </p:nvGrpSpPr>
+      <p:grpSpPr>
+        <a:xfrm>
+          <a:off x="0" y="0"/>
+          <a:ext cx="0" cy="0"/>
+          <a:chOff x="0" y="0"/>
+          <a:chExt cx="0" cy="0"/>
+        </a:xfrm>
+      </p:grpSpPr>
+      <p:sp>
+        <p:nvSpPr>
+          <p:cNvPr id="2" name="Slide Image Placeholder 1"/>
+          <p:cNvSpPr>
+            <a:spLocks noGrp="1" noRot="1" noChangeAspect="1"/>
+          </p:cNvSpPr>
+          <p:nvPr>
+            <p:ph type="sldImg"/>
+          </p:nvPr>
+        </p:nvSpPr>
+        <p:spPr/>
+      </p:sp>
+      <p:sp>
+        <p:nvSpPr>
+          <p:cNvPr id="3" name="Notes Placeholder 2"/>
+          <p:cNvSpPr>
+            <a:spLocks noGrp="1"/>
+          </p:cNvSpPr>
+          <p:nvPr>
+            <p:ph type="body" idx="1"/>
+          </p:nvPr>
+        </p:nvSpPr>
+        <p:spPr/>
+        <p:txBody>
+          <a:bodyPr/>
+          <a:lstStyle/>
+          <a:p>
+            <a:pPr lvl="1"/>
+            <a:r>
+              <a:rPr lang="en-US" dirty="0" err="1"/>
+              <a:t>Značaj</a:t>
+            </a:r>
+            <a:r>
+              <a:rPr lang="bs-Latn-BA" dirty="0"/>
+              <a:t>u</a:t>
+            </a:r>
+            <a:r>
+              <a:rPr lang="en-US" dirty="0"/>
+              <a:t> </a:t>
+            </a:r>
+            <a:r>
+              <a:rPr lang="en-US" dirty="0" err="1"/>
+              <a:t>pojedinca</a:t>
+            </a:r>
+            <a:r>
+              <a:rPr lang="en-US" dirty="0"/>
+              <a:t> – </a:t>
+            </a:r>
+            <a:r>
+              <a:rPr lang="en-US" dirty="0" err="1"/>
+              <a:t>problemi</a:t>
+            </a:r>
+            <a:r>
+              <a:rPr lang="en-US" dirty="0"/>
+              <a:t> se </a:t>
+            </a:r>
+            <a:r>
+              <a:rPr lang="en-US" dirty="0" err="1"/>
+              <a:t>prevazilaze</a:t>
+            </a:r>
+            <a:r>
+              <a:rPr lang="en-US" dirty="0"/>
+              <a:t> </a:t>
+            </a:r>
+            <a:r>
+              <a:rPr lang="en-US" dirty="0" err="1"/>
+              <a:t>zajedničkim</a:t>
+            </a:r>
+            <a:r>
+              <a:rPr lang="en-US" dirty="0"/>
+              <a:t> </a:t>
+            </a:r>
+            <a:r>
+              <a:rPr lang="en-US" dirty="0" err="1"/>
+              <a:t>radom</a:t>
+            </a:r>
+            <a:r>
+              <a:rPr lang="en-US" dirty="0"/>
+              <a:t>, a ne </a:t>
+            </a:r>
+            <a:r>
+              <a:rPr lang="en-US" dirty="0" err="1"/>
+              <a:t>identifikacijom</a:t>
+            </a:r>
+            <a:r>
+              <a:rPr lang="en-US" dirty="0"/>
+              <a:t> </a:t>
+            </a:r>
+            <a:r>
+              <a:rPr lang="en-US" dirty="0" err="1"/>
+              <a:t>pojedinca</a:t>
+            </a:r>
+            <a:r>
+              <a:rPr lang="en-US" dirty="0"/>
+              <a:t> </a:t>
+            </a:r>
+            <a:r>
+              <a:rPr lang="en-US" dirty="0" err="1"/>
+              <a:t>pokazujući</a:t>
+            </a:r>
+            <a:r>
+              <a:rPr lang="en-US" dirty="0"/>
+              <a:t> </a:t>
+            </a:r>
+            <a:r>
+              <a:rPr lang="en-US" dirty="0" err="1"/>
+              <a:t>prstom</a:t>
+            </a:r>
+            <a:r>
+              <a:rPr lang="en-US" dirty="0"/>
+              <a:t> </a:t>
+            </a:r>
+            <a:r>
+              <a:rPr lang="en-US" dirty="0" err="1"/>
+              <a:t>na</a:t>
+            </a:r>
+            <a:r>
+              <a:rPr lang="en-US" dirty="0"/>
+              <a:t> </a:t>
+            </a:r>
+            <a:r>
+              <a:rPr lang="en-US" dirty="0" err="1"/>
+              <a:t>osobu</a:t>
+            </a:r>
+            <a:r>
+              <a:rPr lang="en-US" dirty="0"/>
+              <a:t> </a:t>
+            </a:r>
+            <a:r>
+              <a:rPr lang="en-US" dirty="0" err="1"/>
+              <a:t>koji</a:t>
+            </a:r>
+            <a:r>
+              <a:rPr lang="en-US" dirty="0"/>
+              <a:t> </a:t>
+            </a:r>
+            <a:r>
+              <a:rPr lang="en-US" dirty="0" err="1"/>
+              <a:t>treba</a:t>
+            </a:r>
+            <a:r>
+              <a:rPr lang="en-US" dirty="0"/>
+              <a:t> </a:t>
+            </a:r>
+            <a:r>
+              <a:rPr lang="en-US" dirty="0" err="1"/>
+              <a:t>podnijeti</a:t>
+            </a:r>
+            <a:r>
+              <a:rPr lang="en-US" dirty="0"/>
+              <a:t> </a:t>
+            </a:r>
+            <a:r>
+              <a:rPr lang="en-US" dirty="0" err="1"/>
+              <a:t>cijeli</a:t>
+            </a:r>
+            <a:r>
+              <a:rPr lang="en-US" dirty="0"/>
+              <a:t> </a:t>
+            </a:r>
+            <a:r>
+              <a:rPr lang="en-US" dirty="0" err="1"/>
+              <a:t>teret</a:t>
+            </a:r>
+            <a:r>
+              <a:rPr lang="en-US" dirty="0"/>
+              <a:t> </a:t>
+            </a:r>
+            <a:r>
+              <a:rPr lang="en-US" dirty="0" err="1"/>
+              <a:t>slučaja</a:t>
+            </a:r>
+            <a:r>
+              <a:rPr lang="en-US" dirty="0"/>
+              <a:t> </a:t>
+            </a:r>
+            <a:r>
+              <a:rPr lang="en-US" dirty="0" err="1"/>
+              <a:t>koji</a:t>
+            </a:r>
+            <a:r>
+              <a:rPr lang="en-US" dirty="0"/>
+              <a:t> se </a:t>
+            </a:r>
+            <a:r>
+              <a:rPr lang="en-US" dirty="0" err="1"/>
+              <a:t>proživljava</a:t>
+            </a:r>
+            <a:r>
+              <a:rPr lang="en-US" dirty="0"/>
+              <a:t> u tom </a:t>
+            </a:r>
+            <a:r>
+              <a:rPr lang="en-US" dirty="0" err="1"/>
+              <a:t>momentu</a:t>
+            </a:r>
+            <a:endParaRPr lang="en-US" dirty="0"/>
+          </a:p>
+          <a:p>
+            <a:pPr lvl="1"/>
+            <a:r>
+              <a:rPr lang="en-US" dirty="0" err="1"/>
+              <a:t>Odgovornost</a:t>
+            </a:r>
+            <a:r>
+              <a:rPr lang="en-US" dirty="0"/>
+              <a:t> </a:t>
+            </a:r>
+            <a:r>
+              <a:rPr lang="en-US" dirty="0" err="1"/>
+              <a:t>pojedinca</a:t>
+            </a:r>
+            <a:r>
+              <a:rPr lang="en-US" dirty="0"/>
+              <a:t> </a:t>
+            </a:r>
+            <a:r>
+              <a:rPr lang="en-US" dirty="0" err="1"/>
+              <a:t>i</a:t>
+            </a:r>
+            <a:r>
+              <a:rPr lang="en-US" dirty="0"/>
+              <a:t> </a:t>
+            </a:r>
+            <a:r>
+              <a:rPr lang="en-US" dirty="0" err="1"/>
+              <a:t>tima</a:t>
+            </a:r>
+            <a:r>
+              <a:rPr lang="en-US" dirty="0"/>
+              <a:t> – </a:t>
+            </a:r>
+            <a:r>
+              <a:rPr lang="en-US" dirty="0" err="1"/>
+              <a:t>jedan</a:t>
+            </a:r>
+            <a:r>
+              <a:rPr lang="en-US" dirty="0"/>
+              <a:t> </a:t>
+            </a:r>
+            <a:r>
+              <a:rPr lang="en-US" dirty="0" err="1"/>
+              <a:t>tim</a:t>
+            </a:r>
+            <a:r>
+              <a:rPr lang="en-US" dirty="0"/>
+              <a:t> </a:t>
+            </a:r>
+            <a:r>
+              <a:rPr lang="en-US" dirty="0" err="1"/>
+              <a:t>svoje</a:t>
+            </a:r>
+            <a:r>
+              <a:rPr lang="en-US" dirty="0"/>
+              <a:t> </a:t>
+            </a:r>
+            <a:r>
+              <a:rPr lang="en-US" dirty="0" err="1"/>
+              <a:t>aktivnosti</a:t>
+            </a:r>
+            <a:r>
+              <a:rPr lang="en-US" dirty="0"/>
+              <a:t> u </a:t>
+            </a:r>
+            <a:r>
+              <a:rPr lang="en-US" dirty="0" err="1"/>
+              <a:t>potpunosti</a:t>
+            </a:r>
+            <a:r>
+              <a:rPr lang="en-US" dirty="0"/>
+              <a:t> </a:t>
+            </a:r>
+            <a:r>
+              <a:rPr lang="en-US" dirty="0" err="1"/>
+              <a:t>oslanja</a:t>
+            </a:r>
+            <a:r>
+              <a:rPr lang="en-US" dirty="0"/>
+              <a:t> </a:t>
+            </a:r>
+            <a:r>
+              <a:rPr lang="en-US" dirty="0" err="1"/>
+              <a:t>na</a:t>
+            </a:r>
+            <a:r>
+              <a:rPr lang="en-US" dirty="0"/>
+              <a:t> </a:t>
+            </a:r>
+            <a:r>
+              <a:rPr lang="en-US" dirty="0" err="1"/>
+              <a:t>odgovornost</a:t>
+            </a:r>
+            <a:r>
+              <a:rPr lang="en-US" dirty="0"/>
+              <a:t> </a:t>
+            </a:r>
+            <a:r>
+              <a:rPr lang="en-US" dirty="0" err="1"/>
+              <a:t>drugih</a:t>
+            </a:r>
+            <a:r>
+              <a:rPr lang="en-US" dirty="0"/>
+              <a:t> </a:t>
+            </a:r>
+            <a:r>
+              <a:rPr lang="en-US" dirty="0" err="1"/>
+              <a:t>timova</a:t>
+            </a:r>
+            <a:r>
+              <a:rPr lang="en-US" dirty="0"/>
+              <a:t> </a:t>
+            </a:r>
+            <a:r>
+              <a:rPr lang="en-US" dirty="0" err="1"/>
+              <a:t>i</a:t>
+            </a:r>
+            <a:r>
+              <a:rPr lang="en-US" dirty="0"/>
+              <a:t> </a:t>
+            </a:r>
+            <a:r>
+              <a:rPr lang="en-US" dirty="0" err="1"/>
+              <a:t>pojedinaca</a:t>
+            </a:r>
+            <a:r>
+              <a:rPr lang="en-US" dirty="0"/>
+              <a:t> </a:t>
+            </a:r>
+            <a:r>
+              <a:rPr lang="en-US" dirty="0" err="1"/>
+              <a:t>sa</a:t>
+            </a:r>
+            <a:r>
+              <a:rPr lang="en-US" dirty="0"/>
+              <a:t> </a:t>
+            </a:r>
+            <a:r>
+              <a:rPr lang="en-US" dirty="0" err="1"/>
+              <a:t>kojima</a:t>
+            </a:r>
+            <a:r>
+              <a:rPr lang="en-US" dirty="0"/>
+              <a:t> </a:t>
+            </a:r>
+            <a:r>
+              <a:rPr lang="en-US" dirty="0" err="1"/>
+              <a:t>radi</a:t>
+            </a:r>
+            <a:r>
+              <a:rPr lang="en-US" dirty="0"/>
+              <a:t> </a:t>
+            </a:r>
+            <a:r>
+              <a:rPr lang="en-US" dirty="0" err="1"/>
+              <a:t>na</a:t>
+            </a:r>
+            <a:r>
+              <a:rPr lang="en-US" dirty="0"/>
+              <a:t> </a:t>
+            </a:r>
+            <a:r>
+              <a:rPr lang="en-US" dirty="0" err="1"/>
+              <a:t>projektu</a:t>
+            </a:r>
+            <a:endParaRPr lang="en-US" dirty="0"/>
+          </a:p>
+          <a:p>
+            <a:pPr lvl="1"/>
+            <a:r>
+              <a:rPr lang="en-US" dirty="0" err="1"/>
+              <a:t>Timski</a:t>
+            </a:r>
+            <a:r>
+              <a:rPr lang="en-US" dirty="0"/>
+              <a:t> rad </a:t>
+            </a:r>
+            <a:r>
+              <a:rPr lang="en-US" dirty="0" err="1"/>
+              <a:t>i</a:t>
+            </a:r>
+            <a:r>
+              <a:rPr lang="en-US" dirty="0"/>
+              <a:t> </a:t>
+            </a:r>
+            <a:r>
+              <a:rPr lang="en-US" dirty="0" err="1"/>
+              <a:t>povjerenje</a:t>
+            </a:r>
+            <a:r>
+              <a:rPr lang="en-US" dirty="0"/>
+              <a:t> – </a:t>
+            </a:r>
+            <a:r>
+              <a:rPr lang="en-US" dirty="0" err="1"/>
+              <a:t>slučajevi</a:t>
+            </a:r>
+            <a:r>
+              <a:rPr lang="en-US" dirty="0"/>
+              <a:t> u </a:t>
+            </a:r>
+            <a:r>
+              <a:rPr lang="en-US" dirty="0" err="1"/>
+              <a:t>kojima</a:t>
+            </a:r>
+            <a:r>
+              <a:rPr lang="en-US" dirty="0"/>
+              <a:t> </a:t>
+            </a:r>
+            <a:r>
+              <a:rPr lang="en-US" dirty="0" err="1"/>
+              <a:t>samo</a:t>
+            </a:r>
+            <a:r>
+              <a:rPr lang="en-US" dirty="0"/>
+              <a:t> </a:t>
+            </a:r>
+            <a:r>
+              <a:rPr lang="en-US" dirty="0" err="1"/>
+              <a:t>jedan</a:t>
+            </a:r>
+            <a:r>
+              <a:rPr lang="en-US" dirty="0"/>
+              <a:t> </a:t>
+            </a:r>
+            <a:r>
+              <a:rPr lang="en-US" dirty="0" err="1"/>
+              <a:t>tim</a:t>
+            </a:r>
+            <a:r>
+              <a:rPr lang="en-US" dirty="0"/>
+              <a:t>, za </a:t>
+            </a:r>
+            <a:r>
+              <a:rPr lang="en-US" dirty="0" err="1"/>
+              <a:t>razliku</a:t>
+            </a:r>
+            <a:r>
+              <a:rPr lang="en-US" dirty="0"/>
+              <a:t> od </a:t>
+            </a:r>
+            <a:r>
+              <a:rPr lang="en-US" dirty="0" err="1"/>
+              <a:t>ostalih</a:t>
+            </a:r>
+            <a:r>
+              <a:rPr lang="en-US" dirty="0"/>
+              <a:t> </a:t>
+            </a:r>
+            <a:r>
+              <a:rPr lang="en-US" dirty="0" err="1"/>
+              <a:t>timova</a:t>
+            </a:r>
+            <a:r>
+              <a:rPr lang="en-US" dirty="0"/>
+              <a:t>, </a:t>
+            </a:r>
+            <a:r>
+              <a:rPr lang="en-US" dirty="0" err="1"/>
+              <a:t>radi</a:t>
+            </a:r>
+            <a:r>
+              <a:rPr lang="en-US" dirty="0"/>
+              <a:t> </a:t>
+            </a:r>
+            <a:r>
+              <a:rPr lang="en-US" dirty="0" err="1"/>
+              <a:t>sinhronizovano</a:t>
+            </a:r>
+            <a:r>
+              <a:rPr lang="en-US" dirty="0"/>
+              <a:t> </a:t>
+            </a:r>
+            <a:r>
+              <a:rPr lang="en-US" dirty="0" err="1"/>
+              <a:t>nije</a:t>
+            </a:r>
+            <a:r>
+              <a:rPr lang="en-US" dirty="0"/>
+              <a:t> </a:t>
+            </a:r>
+            <a:r>
+              <a:rPr lang="en-US" dirty="0" err="1"/>
+              <a:t>neki</a:t>
+            </a:r>
+            <a:r>
+              <a:rPr lang="en-US" dirty="0"/>
+              <a:t> </a:t>
+            </a:r>
+            <a:r>
+              <a:rPr lang="en-US" dirty="0" err="1"/>
+              <a:t>pretjeran</a:t>
+            </a:r>
+            <a:r>
+              <a:rPr lang="en-US" dirty="0"/>
+              <a:t> </a:t>
+            </a:r>
+            <a:r>
+              <a:rPr lang="en-US" dirty="0" err="1"/>
+              <a:t>uspjeh</a:t>
+            </a:r>
+            <a:r>
+              <a:rPr lang="en-US" dirty="0"/>
+              <a:t>. </a:t>
+            </a:r>
+            <a:r>
+              <a:rPr lang="en-US" dirty="0" err="1"/>
+              <a:t>Timovi</a:t>
+            </a:r>
+            <a:r>
+              <a:rPr lang="en-US" dirty="0"/>
+              <a:t> </a:t>
+            </a:r>
+            <a:r>
+              <a:rPr lang="en-US" dirty="0" err="1"/>
+              <a:t>stalno</a:t>
+            </a:r>
+            <a:r>
+              <a:rPr lang="en-US" dirty="0"/>
+              <a:t> </a:t>
+            </a:r>
+            <a:r>
+              <a:rPr lang="en-US" dirty="0" err="1"/>
+              <a:t>trebaju</a:t>
+            </a:r>
+            <a:r>
+              <a:rPr lang="en-US" dirty="0"/>
+              <a:t> </a:t>
+            </a:r>
+            <a:r>
+              <a:rPr lang="en-US" dirty="0" err="1"/>
+              <a:t>komunicirati</a:t>
+            </a:r>
+            <a:r>
+              <a:rPr lang="en-US" dirty="0"/>
+              <a:t> </a:t>
+            </a:r>
+            <a:r>
+              <a:rPr lang="en-US" dirty="0" err="1"/>
+              <a:t>i</a:t>
+            </a:r>
+            <a:r>
+              <a:rPr lang="en-US" dirty="0"/>
+              <a:t> </a:t>
+            </a:r>
+            <a:r>
+              <a:rPr lang="en-US" dirty="0" err="1"/>
+              <a:t>sarađivati</a:t>
+            </a:r>
+            <a:r>
+              <a:rPr lang="en-US" dirty="0"/>
+              <a:t>, </a:t>
+            </a:r>
+            <a:r>
+              <a:rPr lang="en-US" dirty="0" err="1"/>
+              <a:t>te</a:t>
+            </a:r>
+            <a:r>
+              <a:rPr lang="en-US" dirty="0"/>
+              <a:t> </a:t>
+            </a:r>
+            <a:r>
+              <a:rPr lang="en-US" dirty="0" err="1"/>
+              <a:t>unapređivati</a:t>
+            </a:r>
+            <a:r>
+              <a:rPr lang="en-US" dirty="0"/>
+              <a:t> </a:t>
+            </a:r>
+            <a:r>
+              <a:rPr lang="en-US" dirty="0" err="1"/>
+              <a:t>jedni</a:t>
+            </a:r>
+            <a:r>
+              <a:rPr lang="en-US" dirty="0"/>
+              <a:t> </a:t>
+            </a:r>
+            <a:r>
+              <a:rPr lang="en-US" dirty="0" err="1"/>
+              <a:t>druge</a:t>
+            </a:r>
+            <a:r>
+              <a:rPr lang="en-US" dirty="0"/>
+              <a:t>. U tom </a:t>
+            </a:r>
+            <a:r>
+              <a:rPr lang="en-US" dirty="0" err="1"/>
+              <a:t>smislu</a:t>
+            </a:r>
+            <a:r>
+              <a:rPr lang="en-US" dirty="0"/>
+              <a:t> </a:t>
+            </a:r>
+            <a:r>
+              <a:rPr lang="en-US" dirty="0" err="1"/>
+              <a:t>veliki</a:t>
+            </a:r>
+            <a:r>
+              <a:rPr lang="en-US" dirty="0"/>
+              <a:t> </a:t>
+            </a:r>
+            <a:r>
+              <a:rPr lang="en-US" dirty="0" err="1"/>
+              <a:t>značaj</a:t>
+            </a:r>
+            <a:r>
+              <a:rPr lang="en-US" dirty="0"/>
+              <a:t> </a:t>
+            </a:r>
+            <a:r>
+              <a:rPr lang="en-US" dirty="0" err="1"/>
+              <a:t>imaju</a:t>
+            </a:r>
+            <a:r>
+              <a:rPr lang="en-US" dirty="0"/>
+              <a:t>: </a:t>
+            </a:r>
+            <a:r>
+              <a:rPr lang="en-US" dirty="0" err="1"/>
+              <a:t>zajednički</a:t>
+            </a:r>
+            <a:r>
+              <a:rPr lang="en-US" dirty="0"/>
+              <a:t> </a:t>
+            </a:r>
+            <a:r>
+              <a:rPr lang="en-US" dirty="0" err="1"/>
+              <a:t>sastanci</a:t>
+            </a:r>
+            <a:r>
+              <a:rPr lang="en-US" dirty="0"/>
+              <a:t>, </a:t>
+            </a:r>
+            <a:r>
+              <a:rPr lang="en-US" dirty="0" err="1"/>
+              <a:t>druženja</a:t>
+            </a:r>
+            <a:r>
+              <a:rPr lang="en-US" dirty="0"/>
+              <a:t>, </a:t>
+            </a:r>
+            <a:r>
+              <a:rPr lang="en-US" dirty="0" err="1"/>
+              <a:t>ručkovi</a:t>
+            </a:r>
+            <a:r>
+              <a:rPr lang="en-US" dirty="0"/>
+              <a:t>, teambuilding </a:t>
+            </a:r>
+            <a:r>
+              <a:rPr lang="en-US" dirty="0" err="1"/>
+              <a:t>događaji</a:t>
+            </a:r>
+            <a:r>
+              <a:rPr lang="en-US" dirty="0"/>
+              <a:t> </a:t>
+            </a:r>
+            <a:r>
+              <a:rPr lang="en-US" dirty="0" err="1"/>
+              <a:t>i</a:t>
+            </a:r>
+            <a:r>
+              <a:rPr lang="en-US" dirty="0"/>
+              <a:t> sl.</a:t>
+            </a:r>
+          </a:p>
+          <a:p>
+            <a:pPr lvl="1"/>
+            <a:r>
+              <a:rPr lang="en-US" dirty="0" err="1"/>
+              <a:t>Stalno</a:t>
+            </a:r>
+            <a:r>
+              <a:rPr lang="en-US" dirty="0"/>
+              <a:t> </a:t>
+            </a:r>
+            <a:r>
+              <a:rPr lang="en-US" dirty="0" err="1"/>
+              <a:t>učenje</a:t>
+            </a:r>
+            <a:r>
+              <a:rPr lang="en-US" dirty="0"/>
+              <a:t> – </a:t>
+            </a:r>
+            <a:r>
+              <a:rPr lang="en-US" dirty="0" err="1"/>
+              <a:t>dijeljenje</a:t>
+            </a:r>
+            <a:r>
+              <a:rPr lang="en-US" dirty="0"/>
+              <a:t> </a:t>
+            </a:r>
+            <a:r>
+              <a:rPr lang="en-US" dirty="0" err="1"/>
+              <a:t>znanja</a:t>
+            </a:r>
+            <a:r>
+              <a:rPr lang="en-US" dirty="0"/>
+              <a:t> </a:t>
+            </a:r>
+            <a:r>
+              <a:rPr lang="en-US" dirty="0" err="1"/>
+              <a:t>i</a:t>
+            </a:r>
+            <a:r>
+              <a:rPr lang="en-US" dirty="0"/>
+              <a:t> </a:t>
+            </a:r>
+            <a:r>
+              <a:rPr lang="en-US" dirty="0" err="1"/>
+              <a:t>stalno</a:t>
+            </a:r>
+            <a:r>
+              <a:rPr lang="en-US" dirty="0"/>
+              <a:t> </a:t>
+            </a:r>
+            <a:r>
+              <a:rPr lang="en-US" dirty="0" err="1"/>
+              <a:t>izgrađivanje</a:t>
+            </a:r>
+            <a:r>
+              <a:rPr lang="en-US" dirty="0"/>
+              <a:t>, </a:t>
+            </a:r>
+            <a:r>
+              <a:rPr lang="en-US" dirty="0" err="1"/>
+              <a:t>kako</a:t>
+            </a:r>
+            <a:r>
+              <a:rPr lang="en-US" dirty="0"/>
+              <a:t> </a:t>
+            </a:r>
+            <a:r>
+              <a:rPr lang="en-US" dirty="0" err="1"/>
+              <a:t>pojedinačno</a:t>
+            </a:r>
+            <a:r>
+              <a:rPr lang="en-US" dirty="0"/>
+              <a:t> </a:t>
+            </a:r>
+            <a:r>
+              <a:rPr lang="en-US" dirty="0" err="1"/>
+              <a:t>tako</a:t>
+            </a:r>
+            <a:r>
+              <a:rPr lang="en-US" dirty="0"/>
+              <a:t> </a:t>
+            </a:r>
+            <a:r>
+              <a:rPr lang="en-US" dirty="0" err="1"/>
+              <a:t>i</a:t>
+            </a:r>
+            <a:r>
+              <a:rPr lang="en-US" dirty="0"/>
+              <a:t> </a:t>
+            </a:r>
+            <a:r>
+              <a:rPr lang="en-US" dirty="0" err="1"/>
+              <a:t>timski</a:t>
+            </a:r>
+            <a:r>
+              <a:rPr lang="en-US" dirty="0"/>
+              <a:t> (</a:t>
+            </a:r>
+            <a:r>
+              <a:rPr lang="en-US" dirty="0" err="1"/>
+              <a:t>konferencije</a:t>
+            </a:r>
+            <a:r>
+              <a:rPr lang="en-US" dirty="0"/>
+              <a:t>, online </a:t>
+            </a:r>
+            <a:r>
+              <a:rPr lang="en-US" dirty="0" err="1"/>
+              <a:t>kursevi</a:t>
+            </a:r>
+            <a:r>
+              <a:rPr lang="en-US" dirty="0"/>
+              <a:t>, </a:t>
+            </a:r>
+            <a:r>
+              <a:rPr lang="en-US" dirty="0" err="1"/>
+              <a:t>kursevi</a:t>
+            </a:r>
+            <a:r>
+              <a:rPr lang="en-US" dirty="0"/>
+              <a:t> </a:t>
+            </a:r>
+            <a:r>
+              <a:rPr lang="en-US" dirty="0" err="1"/>
+              <a:t>unutar</a:t>
+            </a:r>
+            <a:r>
+              <a:rPr lang="en-US" dirty="0"/>
+              <a:t> </a:t>
+            </a:r>
+            <a:r>
+              <a:rPr lang="en-US" dirty="0" err="1"/>
+              <a:t>kompanije</a:t>
+            </a:r>
+            <a:r>
+              <a:rPr lang="en-US" dirty="0"/>
+              <a:t> </a:t>
+            </a:r>
+            <a:r>
+              <a:rPr lang="en-US" dirty="0" err="1"/>
+              <a:t>i</a:t>
+            </a:r>
+            <a:r>
+              <a:rPr lang="en-US" dirty="0"/>
+              <a:t> sl.), </a:t>
+            </a:r>
+            <a:r>
+              <a:rPr lang="en-US" dirty="0" err="1"/>
+              <a:t>prezentovanje</a:t>
+            </a:r>
+            <a:r>
+              <a:rPr lang="en-US" dirty="0"/>
+              <a:t> </a:t>
+            </a:r>
+            <a:r>
+              <a:rPr lang="en-US" dirty="0" err="1"/>
+              <a:t>identifikovanih</a:t>
+            </a:r>
+            <a:r>
+              <a:rPr lang="en-US" dirty="0"/>
+              <a:t> </a:t>
+            </a:r>
+            <a:r>
+              <a:rPr lang="en-US" dirty="0" err="1"/>
+              <a:t>problema</a:t>
+            </a:r>
+            <a:r>
+              <a:rPr lang="en-US" dirty="0"/>
+              <a:t> </a:t>
+            </a:r>
+            <a:r>
+              <a:rPr lang="en-US" dirty="0" err="1"/>
+              <a:t>i</a:t>
+            </a:r>
+            <a:r>
+              <a:rPr lang="en-US" dirty="0"/>
+              <a:t> </a:t>
+            </a:r>
+            <a:r>
+              <a:rPr lang="en-US" dirty="0" err="1"/>
+              <a:t>pristupa</a:t>
+            </a:r>
+            <a:r>
+              <a:rPr lang="en-US" dirty="0"/>
+              <a:t> </a:t>
+            </a:r>
+            <a:r>
+              <a:rPr lang="en-US" dirty="0" err="1"/>
+              <a:t>njihovom</a:t>
+            </a:r>
+            <a:r>
+              <a:rPr lang="en-US" dirty="0"/>
+              <a:t> </a:t>
+            </a:r>
+            <a:r>
+              <a:rPr lang="en-US" dirty="0" err="1"/>
+              <a:t>rješavanju</a:t>
+            </a:r>
+            <a:endParaRPr lang="en-US" dirty="0"/>
+          </a:p>
+          <a:p>
+            <a:pPr lvl="1"/>
+            <a:r>
+              <a:rPr lang="en-US" dirty="0" err="1"/>
+              <a:t>Vrijednosti</a:t>
+            </a:r>
+            <a:r>
+              <a:rPr lang="en-US" dirty="0"/>
+              <a:t> – </a:t>
+            </a:r>
+            <a:r>
+              <a:rPr lang="en-US" dirty="0" err="1"/>
+              <a:t>potrebno</a:t>
+            </a:r>
+            <a:r>
+              <a:rPr lang="en-US" dirty="0"/>
+              <a:t> je </a:t>
+            </a:r>
+            <a:r>
+              <a:rPr lang="en-US" dirty="0" err="1"/>
+              <a:t>voditi</a:t>
+            </a:r>
+            <a:r>
+              <a:rPr lang="en-US" dirty="0"/>
+              <a:t> </a:t>
+            </a:r>
+            <a:r>
+              <a:rPr lang="en-US" dirty="0" err="1"/>
+              <a:t>računa</a:t>
+            </a:r>
+            <a:r>
+              <a:rPr lang="en-US" dirty="0"/>
+              <a:t> o </a:t>
+            </a:r>
+            <a:r>
+              <a:rPr lang="en-US" dirty="0" err="1"/>
+              <a:t>vrijednostima</a:t>
+            </a:r>
+            <a:r>
+              <a:rPr lang="en-US" dirty="0"/>
+              <a:t> </a:t>
+            </a:r>
+            <a:r>
+              <a:rPr lang="en-US" dirty="0" err="1"/>
+              <a:t>koje</a:t>
+            </a:r>
+            <a:r>
+              <a:rPr lang="en-US" dirty="0"/>
+              <a:t> se </a:t>
+            </a:r>
+            <a:r>
+              <a:rPr lang="en-US" dirty="0" err="1"/>
+              <a:t>prepoznaju</a:t>
+            </a:r>
+            <a:r>
+              <a:rPr lang="en-US" dirty="0"/>
+              <a:t> </a:t>
+            </a:r>
+            <a:r>
+              <a:rPr lang="en-US" dirty="0" err="1"/>
+              <a:t>i</a:t>
+            </a:r>
+            <a:r>
+              <a:rPr lang="en-US" dirty="0"/>
+              <a:t>/</a:t>
+            </a:r>
+            <a:r>
+              <a:rPr lang="en-US" dirty="0" err="1"/>
+              <a:t>ili</a:t>
+            </a:r>
+            <a:r>
+              <a:rPr lang="en-US" dirty="0"/>
+              <a:t> </a:t>
+            </a:r>
+            <a:r>
+              <a:rPr lang="en-US" dirty="0" err="1"/>
+              <a:t>nagrađuju</a:t>
+            </a:r>
+            <a:r>
+              <a:rPr lang="en-US" dirty="0"/>
+              <a:t> (</a:t>
+            </a:r>
+            <a:r>
+              <a:rPr lang="en-US" dirty="0" err="1"/>
+              <a:t>kašnjenje</a:t>
+            </a:r>
+            <a:r>
+              <a:rPr lang="en-US" dirty="0"/>
+              <a:t> </a:t>
+            </a:r>
+            <a:r>
+              <a:rPr lang="en-US" dirty="0" err="1"/>
+              <a:t>na</a:t>
+            </a:r>
+            <a:r>
+              <a:rPr lang="en-US" dirty="0"/>
+              <a:t> </a:t>
+            </a:r>
+            <a:r>
+              <a:rPr lang="en-US" dirty="0" err="1"/>
+              <a:t>posao</a:t>
+            </a:r>
+            <a:r>
+              <a:rPr lang="en-US" dirty="0"/>
+              <a:t> </a:t>
+            </a:r>
+            <a:r>
+              <a:rPr lang="en-US" dirty="0" err="1"/>
+              <a:t>i</a:t>
+            </a:r>
+            <a:r>
+              <a:rPr lang="en-US" dirty="0"/>
+              <a:t> </a:t>
+            </a:r>
+            <a:r>
+              <a:rPr lang="en-US" dirty="0" err="1"/>
+              <a:t>kvalitetan</a:t>
+            </a:r>
+            <a:r>
+              <a:rPr lang="en-US" dirty="0"/>
+              <a:t> rad </a:t>
+            </a:r>
+            <a:r>
+              <a:rPr lang="en-US" dirty="0" err="1"/>
+              <a:t>ili</a:t>
+            </a:r>
+            <a:r>
+              <a:rPr lang="en-US" dirty="0"/>
+              <a:t> </a:t>
+            </a:r>
+            <a:r>
+              <a:rPr lang="en-US" dirty="0" err="1"/>
+              <a:t>dolazak</a:t>
+            </a:r>
+            <a:r>
+              <a:rPr lang="en-US" dirty="0"/>
+              <a:t> </a:t>
+            </a:r>
+            <a:r>
+              <a:rPr lang="en-US" dirty="0" err="1"/>
+              <a:t>na</a:t>
+            </a:r>
+            <a:r>
+              <a:rPr lang="en-US" dirty="0"/>
+              <a:t> </a:t>
+            </a:r>
+            <a:r>
+              <a:rPr lang="en-US" dirty="0" err="1"/>
+              <a:t>vrijeme</a:t>
+            </a:r>
+            <a:r>
+              <a:rPr lang="en-US" dirty="0"/>
+              <a:t> </a:t>
+            </a:r>
+            <a:r>
+              <a:rPr lang="en-US" dirty="0" err="1"/>
+              <a:t>i</a:t>
+            </a:r>
+            <a:r>
+              <a:rPr lang="en-US" dirty="0"/>
+              <a:t> </a:t>
+            </a:r>
+            <a:r>
+              <a:rPr lang="en-US" dirty="0" err="1"/>
+              <a:t>mnogo</a:t>
+            </a:r>
+            <a:r>
+              <a:rPr lang="en-US" dirty="0"/>
+              <a:t> </a:t>
+            </a:r>
+            <a:r>
+              <a:rPr lang="en-US" dirty="0" err="1"/>
+              <a:t>nedostataka</a:t>
+            </a:r>
+            <a:r>
+              <a:rPr lang="en-US" dirty="0"/>
+              <a:t> u </a:t>
+            </a:r>
+            <a:r>
+              <a:rPr lang="en-US" dirty="0" err="1"/>
+              <a:t>radu</a:t>
+            </a:r>
+            <a:r>
+              <a:rPr lang="en-US" dirty="0"/>
+              <a:t>)</a:t>
+            </a:r>
+          </a:p>
+          <a:p>
+            <a:endParaRPr lang="en-US" dirty="0"/>
+          </a:p>
+        </p:txBody>
+      </p:sp>
+      <p:sp>
+        <p:nvSpPr>
+          <p:cNvPr id="4" name="Slide Number Placeholder 3"/>
+          <p:cNvSpPr>
+            <a:spLocks noGrp="1"/>
+          </p:cNvSpPr>
+          <p:nvPr>
+            <p:ph type="sldNum" sz="quarter" idx="5"/>
+          </p:nvPr>
+        </p:nvSpPr>
+        <p:spPr/>
+        <p:txBody>
+          <a:bodyPr/>
+          <a:lstStyle/>
+          <a:p>
+            <a:fld id="{7B12DC4F-78C5-4EA5-A0E6-C5E98FFDA7F4}" type="slidenum">
+              <a:rPr lang="en-US" smtClean="0"/>
               <a:t>12</a:t>
             </a:fld>
             <a:endParaRPr lang="en-US"/>
@@ -5501,7 +5774,7 @@
 </p:notes>
 </file>
 
-<file path=ppt/notesSlides/notesSlide2.xml><?xml version="1.0" encoding="utf-8"?>
+<file path=ppt/notesSlides/notesSlide5.xml><?xml version="1.0" encoding="utf-8"?>
 <p:notes xmlns:a="http://schemas.openxmlformats.org/drawingml/2006/main" xmlns:r="http://schemas.openxmlformats.org/officeDocument/2006/relationships" xmlns:p="http://schemas.openxmlformats.org/presentationml/2006/main">
   <p:cSld>
     <p:spTree>
@@ -5732,7 +6005,7 @@
           <a:p>
             <a:fld id="{5656AB5E-32E1-46DC-B72C-90B8BE30630E}" type="datetimeFigureOut">
               <a:rPr lang="en-US" smtClean="0"/>
-              <a:t>5/13/2019</a:t>
+              <a:t>5/16/2019</a:t>
             </a:fld>
             <a:endParaRPr lang="en-US"/>
           </a:p>
@@ -5930,7 +6203,7 @@
           <a:p>
             <a:fld id="{5656AB5E-32E1-46DC-B72C-90B8BE30630E}" type="datetimeFigureOut">
               <a:rPr lang="en-US" smtClean="0"/>
-              <a:t>5/13/2019</a:t>
+              <a:t>5/16/2019</a:t>
             </a:fld>
             <a:endParaRPr lang="en-US"/>
           </a:p>
@@ -6138,7 +6411,7 @@
           <a:p>
             <a:fld id="{5656AB5E-32E1-46DC-B72C-90B8BE30630E}" type="datetimeFigureOut">
               <a:rPr lang="en-US" smtClean="0"/>
-              <a:t>5/13/2019</a:t>
+              <a:t>5/16/2019</a:t>
             </a:fld>
             <a:endParaRPr lang="en-US"/>
           </a:p>
@@ -6336,7 +6609,7 @@
           <a:p>
             <a:fld id="{5656AB5E-32E1-46DC-B72C-90B8BE30630E}" type="datetimeFigureOut">
               <a:rPr lang="en-US" smtClean="0"/>
-              <a:t>5/13/2019</a:t>
+              <a:t>5/16/2019</a:t>
             </a:fld>
             <a:endParaRPr lang="en-US"/>
           </a:p>
@@ -6611,7 +6884,7 @@
           <a:p>
             <a:fld id="{5656AB5E-32E1-46DC-B72C-90B8BE30630E}" type="datetimeFigureOut">
               <a:rPr lang="en-US" smtClean="0"/>
-              <a:t>5/13/2019</a:t>
+              <a:t>5/16/2019</a:t>
             </a:fld>
             <a:endParaRPr lang="en-US"/>
           </a:p>
@@ -6876,7 +7149,7 @@
           <a:p>
             <a:fld id="{5656AB5E-32E1-46DC-B72C-90B8BE30630E}" type="datetimeFigureOut">
               <a:rPr lang="en-US" smtClean="0"/>
-              <a:t>5/13/2019</a:t>
+              <a:t>5/16/2019</a:t>
             </a:fld>
             <a:endParaRPr lang="en-US"/>
           </a:p>
@@ -7288,7 +7561,7 @@
           <a:p>
             <a:fld id="{5656AB5E-32E1-46DC-B72C-90B8BE30630E}" type="datetimeFigureOut">
               <a:rPr lang="en-US" smtClean="0"/>
-              <a:t>5/13/2019</a:t>
+              <a:t>5/16/2019</a:t>
             </a:fld>
             <a:endParaRPr lang="en-US"/>
           </a:p>
@@ -7429,7 +7702,7 @@
           <a:p>
             <a:fld id="{5656AB5E-32E1-46DC-B72C-90B8BE30630E}" type="datetimeFigureOut">
               <a:rPr lang="en-US" smtClean="0"/>
-              <a:t>5/13/2019</a:t>
+              <a:t>5/16/2019</a:t>
             </a:fld>
             <a:endParaRPr lang="en-US"/>
           </a:p>
@@ -7542,7 +7815,7 @@
           <a:p>
             <a:fld id="{5656AB5E-32E1-46DC-B72C-90B8BE30630E}" type="datetimeFigureOut">
               <a:rPr lang="en-US" smtClean="0"/>
-              <a:t>5/13/2019</a:t>
+              <a:t>5/16/2019</a:t>
             </a:fld>
             <a:endParaRPr lang="en-US"/>
           </a:p>
@@ -7853,7 +8126,7 @@
           <a:p>
             <a:fld id="{5656AB5E-32E1-46DC-B72C-90B8BE30630E}" type="datetimeFigureOut">
               <a:rPr lang="en-US" smtClean="0"/>
-              <a:t>5/13/2019</a:t>
+              <a:t>5/16/2019</a:t>
             </a:fld>
             <a:endParaRPr lang="en-US"/>
           </a:p>
@@ -8141,7 +8414,7 @@
           <a:p>
             <a:fld id="{5656AB5E-32E1-46DC-B72C-90B8BE30630E}" type="datetimeFigureOut">
               <a:rPr lang="en-US" smtClean="0"/>
-              <a:t>5/13/2019</a:t>
+              <a:t>5/16/2019</a:t>
             </a:fld>
             <a:endParaRPr lang="en-US"/>
           </a:p>
@@ -8382,7 +8655,7 @@
           <a:p>
             <a:fld id="{5656AB5E-32E1-46DC-B72C-90B8BE30630E}" type="datetimeFigureOut">
               <a:rPr lang="en-US" smtClean="0"/>
-              <a:t>5/13/2019</a:t>
+              <a:t>5/16/2019</a:t>
             </a:fld>
             <a:endParaRPr lang="en-US"/>
           </a:p>
@@ -9141,53 +9414,6 @@
           </a:p>
         </p:txBody>
       </p:sp>
-      <p:pic>
-        <p:nvPicPr>
-          <p:cNvPr id="4" name="Picture 2" descr="Rezultat slika za automatization">
-            <a:extLst>
-              <a:ext uri="{FF2B5EF4-FFF2-40B4-BE49-F238E27FC236}">
-                <a16:creationId xmlns:a16="http://schemas.microsoft.com/office/drawing/2014/main" id="{69680C67-D0B3-4A64-B2D3-8BC3EC56203E}"/>
-              </a:ext>
-            </a:extLst>
-          </p:cNvPr>
-          <p:cNvPicPr>
-            <a:picLocks noChangeAspect="1" noChangeArrowheads="1"/>
-          </p:cNvPicPr>
-          <p:nvPr/>
-        </p:nvPicPr>
-        <p:blipFill>
-          <a:blip r:embed="rId2">
-            <a:extLst>
-              <a:ext uri="{28A0092B-C50C-407E-A947-70E740481C1C}">
-                <a14:useLocalDpi xmlns:a14="http://schemas.microsoft.com/office/drawing/2010/main" val="0"/>
-              </a:ext>
-            </a:extLst>
-          </a:blip>
-          <a:srcRect/>
-          <a:stretch>
-            <a:fillRect/>
-          </a:stretch>
-        </p:blipFill>
-        <p:spPr bwMode="auto">
-          <a:xfrm>
-            <a:off x="9181932" y="4969923"/>
-            <a:ext cx="2081312" cy="1252278"/>
-          </a:xfrm>
-          <a:prstGeom prst="rect">
-            <a:avLst/>
-          </a:prstGeom>
-          <a:noFill/>
-          <a:extLst>
-            <a:ext uri="{909E8E84-426E-40DD-AFC4-6F175D3DCCD1}">
-              <a14:hiddenFill xmlns:a14="http://schemas.microsoft.com/office/drawing/2010/main">
-                <a:solidFill>
-                  <a:srgbClr val="FFFFFF"/>
-                </a:solidFill>
-              </a14:hiddenFill>
-            </a:ext>
-          </a:extLst>
-        </p:spPr>
-      </p:pic>
     </p:spTree>
     <p:extLst>
       <p:ext uri="{BB962C8B-B14F-4D97-AF65-F5344CB8AC3E}">
@@ -11977,12 +12203,18 @@
         <p:spPr/>
         <p:txBody>
           <a:bodyPr>
-            <a:normAutofit fontScale="92500" lnSpcReduction="10000"/>
+            <a:normAutofit lnSpcReduction="10000"/>
           </a:bodyPr>
           <a:lstStyle/>
           <a:p>
             <a:r>
               <a:rPr lang="bs-Latn-BA" dirty="0"/>
+              <a:t>Uvodne napomene </a:t>
+            </a:r>
+          </a:p>
+          <a:p>
+            <a:r>
+              <a:rPr lang="bs-Latn-BA" dirty="0"/>
               <a:t>Šta je </a:t>
             </a:r>
             <a:r>
@@ -11992,22 +12224,6 @@
             <a:r>
               <a:rPr lang="bs-Latn-BA" dirty="0"/>
               <a:t>?</a:t>
-            </a:r>
-          </a:p>
-          <a:p>
-            <a:r>
-              <a:rPr lang="bs-Latn-BA" dirty="0" err="1"/>
-              <a:t>DevOps</a:t>
-            </a:r>
-            <a:r>
-              <a:rPr lang="bs-Latn-BA" dirty="0"/>
-              <a:t> u kontekstu drugih razvojnih paradigmi</a:t>
-            </a:r>
-          </a:p>
-          <a:p>
-            <a:r>
-              <a:rPr lang="bs-Latn-BA" dirty="0"/>
-              <a:t>Metode Vođenja projekata</a:t>
             </a:r>
           </a:p>
           <a:p>
@@ -12975,6 +13191,101 @@
 </p:sld>
 </file>
 
+<file path=ppt/slides/slide24.xml><?xml version="1.0" encoding="utf-8"?>
+<p:sld xmlns:a="http://schemas.openxmlformats.org/drawingml/2006/main" xmlns:r="http://schemas.openxmlformats.org/officeDocument/2006/relationships" xmlns:p="http://schemas.openxmlformats.org/presentationml/2006/main">
+  <p:cSld>
+    <p:spTree>
+      <p:nvGrpSpPr>
+        <p:cNvPr id="1" name=""/>
+        <p:cNvGrpSpPr/>
+        <p:nvPr/>
+      </p:nvGrpSpPr>
+      <p:grpSpPr>
+        <a:xfrm>
+          <a:off x="0" y="0"/>
+          <a:ext cx="0" cy="0"/>
+          <a:chOff x="0" y="0"/>
+          <a:chExt cx="0" cy="0"/>
+        </a:xfrm>
+      </p:grpSpPr>
+      <p:sp>
+        <p:nvSpPr>
+          <p:cNvPr id="2" name="Title 1">
+            <a:extLst>
+              <a:ext uri="{FF2B5EF4-FFF2-40B4-BE49-F238E27FC236}">
+                <a16:creationId xmlns:a16="http://schemas.microsoft.com/office/drawing/2014/main" id="{228143AD-FE8E-4B54-9A58-B9572EC27911}"/>
+              </a:ext>
+            </a:extLst>
+          </p:cNvPr>
+          <p:cNvSpPr>
+            <a:spLocks noGrp="1"/>
+          </p:cNvSpPr>
+          <p:nvPr>
+            <p:ph type="title"/>
+          </p:nvPr>
+        </p:nvSpPr>
+        <p:spPr/>
+        <p:txBody>
+          <a:bodyPr/>
+          <a:lstStyle/>
+          <a:p>
+            <a:r>
+              <a:rPr lang="bs-Latn-BA" dirty="0" err="1"/>
+              <a:t>DevOps</a:t>
+            </a:r>
+            <a:r>
+              <a:rPr lang="bs-Latn-BA" dirty="0"/>
+              <a:t>	</a:t>
+            </a:r>
+            <a:endParaRPr lang="en-US" dirty="0"/>
+          </a:p>
+        </p:txBody>
+      </p:sp>
+      <p:sp>
+        <p:nvSpPr>
+          <p:cNvPr id="3" name="Content Placeholder 2">
+            <a:extLst>
+              <a:ext uri="{FF2B5EF4-FFF2-40B4-BE49-F238E27FC236}">
+                <a16:creationId xmlns:a16="http://schemas.microsoft.com/office/drawing/2014/main" id="{ADD158AC-D334-4490-B624-B8EEA7165F41}"/>
+              </a:ext>
+            </a:extLst>
+          </p:cNvPr>
+          <p:cNvSpPr>
+            <a:spLocks noGrp="1"/>
+          </p:cNvSpPr>
+          <p:nvPr>
+            <p:ph idx="1"/>
+          </p:nvPr>
+        </p:nvSpPr>
+        <p:spPr/>
+        <p:txBody>
+          <a:bodyPr/>
+          <a:lstStyle/>
+          <a:p>
+            <a:r>
+              <a:rPr lang="bs-Latn-BA" dirty="0"/>
+              <a:t>Implementacija CI i CD</a:t>
+            </a:r>
+          </a:p>
+          <a:p>
+            <a:pPr lvl="1"/>
+            <a:endParaRPr lang="en-US" dirty="0"/>
+          </a:p>
+        </p:txBody>
+      </p:sp>
+    </p:spTree>
+    <p:extLst>
+      <p:ext uri="{BB962C8B-B14F-4D97-AF65-F5344CB8AC3E}">
+        <p14:creationId xmlns:p14="http://schemas.microsoft.com/office/powerpoint/2010/main" val="2659664110"/>
+      </p:ext>
+    </p:extLst>
+  </p:cSld>
+  <p:clrMapOvr>
+    <a:masterClrMapping/>
+  </p:clrMapOvr>
+</p:sld>
+</file>
+
 <file path=ppt/slides/slide3.xml><?xml version="1.0" encoding="utf-8"?>
 <p:sld xmlns:a="http://schemas.openxmlformats.org/drawingml/2006/main" xmlns:r="http://schemas.openxmlformats.org/officeDocument/2006/relationships" xmlns:p="http://schemas.openxmlformats.org/presentationml/2006/main">
   <p:cSld>
@@ -13015,7 +13326,7 @@
           <a:p>
             <a:r>
               <a:rPr lang="bs-Latn-BA" dirty="0"/>
-              <a:t>Dileme, Činjenice i Rješenja u softverskoj industriji</a:t>
+              <a:t>Razvoj softvera</a:t>
             </a:r>
             <a:endParaRPr lang="en-US" dirty="0"/>
           </a:p>
@@ -13237,7 +13548,7 @@
           <a:p>
             <a:r>
               <a:rPr lang="bs-Latn-BA" dirty="0"/>
-              <a:t>Dileme, činjenice i rješenja u softverskoj industriji</a:t>
+              <a:t>Razvoj softvera</a:t>
             </a:r>
             <a:endParaRPr lang="en-US" dirty="0"/>
           </a:p>
@@ -13267,24 +13578,12 @@
           <a:lstStyle/>
           <a:p>
             <a:r>
-              <a:rPr lang="en-US" dirty="0" err="1"/>
-              <a:t>Ispunjenje</a:t>
-            </a:r>
-            <a:r>
-              <a:rPr lang="en-US" dirty="0"/>
-              <a:t> </a:t>
-            </a:r>
-            <a:r>
-              <a:rPr lang="en-US" dirty="0" err="1"/>
-              <a:t>očekivanja</a:t>
-            </a:r>
-            <a:r>
-              <a:rPr lang="en-US" dirty="0"/>
-              <a:t> je </a:t>
-            </a:r>
-            <a:r>
-              <a:rPr lang="en-US" dirty="0" err="1"/>
-              <a:t>veoma</a:t>
+              <a:rPr lang="bs-Latn-BA" dirty="0"/>
+              <a:t>O</a:t>
+            </a:r>
+            <a:r>
+              <a:rPr lang="en-US" dirty="0" err="1"/>
+              <a:t>čekivanja</a:t>
             </a:r>
             <a:r>
               <a:rPr lang="en-US" dirty="0"/>
@@ -13646,7 +13945,7 @@
           <a:p>
             <a:r>
               <a:rPr lang="bs-Latn-BA" dirty="0"/>
-              <a:t>Dileme, činjenice i rješenja u softverskoj industriji</a:t>
+              <a:t>Razvoj softvera</a:t>
             </a:r>
             <a:endParaRPr lang="en-US" dirty="0"/>
           </a:p>
@@ -13790,7 +14089,7 @@
           <a:p>
             <a:r>
               <a:rPr lang="bs-Latn-BA" dirty="0"/>
-              <a:t>Dileme, činjenice i rješenja u softverskoj industriji</a:t>
+              <a:t>Razvoj softvera</a:t>
             </a:r>
             <a:endParaRPr lang="en-US" dirty="0"/>
           </a:p>
@@ -13861,15 +14160,7 @@
             <a:pPr lvl="1"/>
             <a:r>
               <a:rPr lang="bs-Latn-BA" dirty="0"/>
-              <a:t>Drastično smanjenje ljudskih resursa jer se </a:t>
-            </a:r>
-            <a:r>
-              <a:rPr lang="bs-Latn-BA" dirty="0" err="1"/>
-              <a:t>kuuje</a:t>
-            </a:r>
-            <a:r>
-              <a:rPr lang="bs-Latn-BA" dirty="0"/>
-              <a:t> servis, a ne hardver komu treba IT da ga stavi u funkciju</a:t>
+              <a:t>Drastično smanjenje ljudskih resursa jer se kupuje servis, a ne hardver kome treba IT da ga stavi u funkciju</a:t>
             </a:r>
           </a:p>
           <a:p>
@@ -13947,16 +14238,12 @@
           <a:lstStyle/>
           <a:p>
             <a:r>
-              <a:rPr lang="bs-Latn-BA" dirty="0"/>
-              <a:t>Šta je </a:t>
-            </a:r>
-            <a:r>
               <a:rPr lang="bs-Latn-BA" dirty="0" err="1"/>
               <a:t>DevOps</a:t>
             </a:r>
             <a:r>
               <a:rPr lang="bs-Latn-BA" dirty="0"/>
-              <a:t>?</a:t>
+              <a:t> – moguće rješenje problema</a:t>
             </a:r>
             <a:endParaRPr lang="en-US" dirty="0"/>
           </a:p>
@@ -14010,11 +14297,14 @@
               </a:rPr>
               <a:t>Dev</a:t>
             </a:r>
-            <a:endParaRPr lang="bs-Latn-BA" dirty="0">
-              <a:solidFill>
-                <a:srgbClr val="FF0000"/>
-              </a:solidFill>
-            </a:endParaRPr>
+            <a:r>
+              <a:rPr lang="bs-Latn-BA" dirty="0">
+                <a:solidFill>
+                  <a:srgbClr val="FF0000"/>
+                </a:solidFill>
+              </a:rPr>
+              <a:t> i</a:t>
+            </a:r>
           </a:p>
           <a:p>
             <a:pPr lvl="1"/>
@@ -14199,7 +14489,7 @@
         <p:spPr/>
         <p:txBody>
           <a:bodyPr>
-            <a:normAutofit lnSpcReduction="10000"/>
+            <a:normAutofit/>
           </a:bodyPr>
           <a:lstStyle/>
           <a:p>
@@ -14224,48 +14514,12 @@
               <a:t> </a:t>
             </a:r>
             <a:r>
-              <a:rPr lang="en-US" dirty="0" err="1"/>
-              <a:t>koji</a:t>
-            </a:r>
-            <a:r>
-              <a:rPr lang="en-US" dirty="0"/>
-              <a:t> </a:t>
-            </a:r>
-            <a:r>
-              <a:rPr lang="en-US" dirty="0" err="1"/>
-              <a:t>treba</a:t>
-            </a:r>
-            <a:r>
-              <a:rPr lang="en-US" dirty="0"/>
-              <a:t> </a:t>
-            </a:r>
-            <a:r>
-              <a:rPr lang="en-US" dirty="0" err="1"/>
-              <a:t>premostiti</a:t>
-            </a:r>
-            <a:r>
-              <a:rPr lang="en-US" dirty="0"/>
-              <a:t> </a:t>
-            </a:r>
-            <a:r>
-              <a:rPr lang="en-US" dirty="0" err="1"/>
-              <a:t>procjep</a:t>
-            </a:r>
-            <a:r>
-              <a:rPr lang="en-US" dirty="0"/>
-              <a:t> </a:t>
-            </a:r>
-            <a:r>
-              <a:rPr lang="en-US" dirty="0" err="1"/>
-              <a:t>koji</a:t>
-            </a:r>
-            <a:r>
-              <a:rPr lang="en-US" dirty="0"/>
-              <a:t> </a:t>
-            </a:r>
-            <a:r>
-              <a:rPr lang="en-US" dirty="0" err="1"/>
-              <a:t>evidentno</a:t>
+              <a:rPr lang="bs-Latn-BA" dirty="0" err="1"/>
+              <a:t>premoštavanja</a:t>
+            </a:r>
+            <a:r>
+              <a:rPr lang="bs-Latn-BA" dirty="0"/>
+              <a:t> problema koji</a:t>
             </a:r>
             <a:r>
               <a:rPr lang="en-US" dirty="0"/>
@@ -14308,60 +14562,6 @@
               <a:t>kompanije</a:t>
             </a:r>
             <a:endParaRPr lang="en-US" dirty="0"/>
-          </a:p>
-          <a:p>
-            <a:r>
-              <a:rPr lang="en-US" dirty="0" err="1"/>
-              <a:t>Zašto</a:t>
-            </a:r>
-            <a:r>
-              <a:rPr lang="en-US" dirty="0"/>
-              <a:t> </a:t>
-            </a:r>
-            <a:r>
-              <a:rPr lang="en-US" dirty="0" err="1"/>
-              <a:t>nam</a:t>
-            </a:r>
-            <a:r>
-              <a:rPr lang="en-US" dirty="0"/>
-              <a:t> je </a:t>
-            </a:r>
-            <a:r>
-              <a:rPr lang="en-US" dirty="0" err="1"/>
-              <a:t>uop</a:t>
-            </a:r>
-            <a:r>
-              <a:rPr lang="bs-Latn-BA" dirty="0"/>
-              <a:t>ć</a:t>
-            </a:r>
-            <a:r>
-              <a:rPr lang="en-US" dirty="0"/>
-              <a:t>e </a:t>
-            </a:r>
-            <a:r>
-              <a:rPr lang="en-US" dirty="0" err="1"/>
-              <a:t>sve</a:t>
-            </a:r>
-            <a:r>
-              <a:rPr lang="en-US" dirty="0"/>
-              <a:t> to </a:t>
-            </a:r>
-            <a:r>
-              <a:rPr lang="en-US" dirty="0" err="1"/>
-              <a:t>toliko</a:t>
-            </a:r>
-            <a:r>
-              <a:rPr lang="en-US" dirty="0"/>
-              <a:t> </a:t>
-            </a:r>
-            <a:r>
-              <a:rPr lang="en-US" dirty="0" err="1"/>
-              <a:t>značajno</a:t>
-            </a:r>
-            <a:r>
-              <a:rPr lang="en-US" dirty="0"/>
-              <a:t>? </a:t>
-            </a:r>
           </a:p>
           <a:p>
             <a:r>

</xml_diff>